<commit_message>
Updated slides and files
</commit_message>
<xml_diff>
--- a/Slides/DockerPresentation.pptx
+++ b/Slides/DockerPresentation.pptx
@@ -5,19 +5,18 @@
     <p:sldMasterId id="2147483648" r:id="rId1"/>
   </p:sldMasterIdLst>
   <p:notesMasterIdLst>
-    <p:notesMasterId r:id="rId12"/>
+    <p:notesMasterId r:id="rId11"/>
   </p:notesMasterIdLst>
   <p:sldIdLst>
     <p:sldId id="256" r:id="rId2"/>
     <p:sldId id="257" r:id="rId3"/>
-    <p:sldId id="258" r:id="rId4"/>
-    <p:sldId id="265" r:id="rId5"/>
-    <p:sldId id="259" r:id="rId6"/>
-    <p:sldId id="260" r:id="rId7"/>
-    <p:sldId id="261" r:id="rId8"/>
-    <p:sldId id="262" r:id="rId9"/>
-    <p:sldId id="263" r:id="rId10"/>
-    <p:sldId id="264" r:id="rId11"/>
+    <p:sldId id="265" r:id="rId4"/>
+    <p:sldId id="267" r:id="rId5"/>
+    <p:sldId id="266" r:id="rId6"/>
+    <p:sldId id="268" r:id="rId7"/>
+    <p:sldId id="269" r:id="rId8"/>
+    <p:sldId id="270" r:id="rId9"/>
+    <p:sldId id="264" r:id="rId10"/>
   </p:sldIdLst>
   <p:sldSz cx="12192000" cy="6858000"/>
   <p:notesSz cx="6858000" cy="9144000"/>
@@ -206,7 +205,7 @@
           <a:p>
             <a:fld id="{8C60E988-0E53-4576-9AF6-061A69C37B54}" type="datetimeFigureOut">
               <a:rPr lang="en-US" smtClean="0"/>
-              <a:t>8/12/2021</a:t>
+              <a:t>8/14/2021</a:t>
             </a:fld>
             <a:endParaRPr lang="en-US"/>
           </a:p>
@@ -612,7 +611,19 @@
           <a:p>
             <a:r>
               <a:rPr lang="en-US" dirty="0"/>
-              <a:t>3 our to the 5 are true</a:t>
+              <a:t>My name is David and I made just enough mistakes to break into this industry 5 years ago after pursuing a degree in education. </a:t>
+            </a:r>
+          </a:p>
+          <a:p>
+            <a:r>
+              <a:rPr lang="en-US" dirty="0"/>
+              <a:t>I wanted to be a teacher because I’ve historically lacked confidence and if it weren’t for the teachers I’ve had, I wouldn’t have the courage to do the things I do.</a:t>
+            </a:r>
+          </a:p>
+          <a:p>
+            <a:r>
+              <a:rPr lang="en-US" dirty="0"/>
+              <a:t>That said, I’m giving this presentation not as an educator or engineer, but as a catalyst for confidence.</a:t>
             </a:r>
           </a:p>
         </p:txBody>
@@ -699,16 +710,13 @@
           <a:p>
             <a:r>
               <a:rPr lang="en-US" dirty="0"/>
-              <a:t>Establish a common understanding of how complex everyone thinks docker is.</a:t>
+              <a:t>If you’d like to follow along with the demo towards the end of this presentation: get started by following the instructions in the Scripts README.md.</a:t>
             </a:r>
-          </a:p>
-          <a:p>
-            <a:endParaRPr lang="en-US" dirty="0"/>
           </a:p>
           <a:p>
             <a:r>
               <a:rPr lang="en-US" dirty="0"/>
-              <a:t>In my experience, it takes 2 developers to ignite the first implementations and after that, with some mentoring a junior can maintain it.</a:t>
+              <a:t>I’m going to running the demo from within Microsoft Sandbox. That means I’ll be running docker containers on a virtual machine.</a:t>
             </a:r>
           </a:p>
         </p:txBody>
@@ -739,7 +747,7 @@
     </p:spTree>
     <p:extLst>
       <p:ext uri="{BB962C8B-B14F-4D97-AF65-F5344CB8AC3E}">
-        <p14:creationId xmlns:p14="http://schemas.microsoft.com/office/powerpoint/2010/main" val="2424126708"/>
+        <p14:creationId xmlns:p14="http://schemas.microsoft.com/office/powerpoint/2010/main" val="2211544046"/>
       </p:ext>
     </p:extLst>
   </p:cSld>
@@ -793,21 +801,10 @@
           <a:bodyPr/>
           <a:lstStyle/>
           <a:p>
-            <a:pPr marL="171450" indent="-171450">
-              <a:buFont typeface="Arial" panose="020B0604020202020204" pitchFamily="34" charset="0"/>
-              <a:buChar char="•"/>
-            </a:pPr>
             <a:r>
-              <a:rPr lang="en-US" b="0" i="0" dirty="0">
-                <a:solidFill>
-                  <a:srgbClr val="222222"/>
-                </a:solidFill>
-                <a:effectLst/>
-                <a:latin typeface="DDG_ProximaNova"/>
-              </a:rPr>
-              <a:t>Docker is a set of platform as a service products that use OS-level virtualization to deliver software in packages called containers.</a:t>
+              <a:rPr lang="en-US" dirty="0"/>
+              <a:t>If you’re watching at home, I do not recommend taking a shot every time I say containers.</a:t>
             </a:r>
-            <a:endParaRPr lang="en-US" dirty="0"/>
           </a:p>
         </p:txBody>
       </p:sp>
@@ -837,7 +834,94 @@
     </p:spTree>
     <p:extLst>
       <p:ext uri="{BB962C8B-B14F-4D97-AF65-F5344CB8AC3E}">
-        <p14:creationId xmlns:p14="http://schemas.microsoft.com/office/powerpoint/2010/main" val="2609194944"/>
+        <p14:creationId xmlns:p14="http://schemas.microsoft.com/office/powerpoint/2010/main" val="3643941159"/>
+      </p:ext>
+    </p:extLst>
+  </p:cSld>
+  <p:clrMapOvr>
+    <a:masterClrMapping/>
+  </p:clrMapOvr>
+</p:notes>
+</file>
+
+<file path=ppt/notesSlides/notesSlide5.xml><?xml version="1.0" encoding="utf-8"?>
+<p:notes xmlns:a="http://schemas.openxmlformats.org/drawingml/2006/main" xmlns:r="http://schemas.openxmlformats.org/officeDocument/2006/relationships" xmlns:p="http://schemas.openxmlformats.org/presentationml/2006/main">
+  <p:cSld>
+    <p:spTree>
+      <p:nvGrpSpPr>
+        <p:cNvPr id="1" name=""/>
+        <p:cNvGrpSpPr/>
+        <p:nvPr/>
+      </p:nvGrpSpPr>
+      <p:grpSpPr>
+        <a:xfrm>
+          <a:off x="0" y="0"/>
+          <a:ext cx="0" cy="0"/>
+          <a:chOff x="0" y="0"/>
+          <a:chExt cx="0" cy="0"/>
+        </a:xfrm>
+      </p:grpSpPr>
+      <p:sp>
+        <p:nvSpPr>
+          <p:cNvPr id="2" name="Slide Image Placeholder 1"/>
+          <p:cNvSpPr>
+            <a:spLocks noGrp="1" noRot="1" noChangeAspect="1"/>
+          </p:cNvSpPr>
+          <p:nvPr>
+            <p:ph type="sldImg"/>
+          </p:nvPr>
+        </p:nvSpPr>
+        <p:spPr/>
+      </p:sp>
+      <p:sp>
+        <p:nvSpPr>
+          <p:cNvPr id="3" name="Notes Placeholder 2"/>
+          <p:cNvSpPr>
+            <a:spLocks noGrp="1"/>
+          </p:cNvSpPr>
+          <p:nvPr>
+            <p:ph type="body" idx="1"/>
+          </p:nvPr>
+        </p:nvSpPr>
+        <p:spPr/>
+        <p:txBody>
+          <a:bodyPr/>
+          <a:lstStyle/>
+          <a:p>
+            <a:r>
+              <a:rPr lang="en-US" dirty="0"/>
+              <a:t>This will make more sense when we look at the code</a:t>
+            </a:r>
+          </a:p>
+        </p:txBody>
+      </p:sp>
+      <p:sp>
+        <p:nvSpPr>
+          <p:cNvPr id="4" name="Slide Number Placeholder 3"/>
+          <p:cNvSpPr>
+            <a:spLocks noGrp="1"/>
+          </p:cNvSpPr>
+          <p:nvPr>
+            <p:ph type="sldNum" sz="quarter" idx="5"/>
+          </p:nvPr>
+        </p:nvSpPr>
+        <p:spPr/>
+        <p:txBody>
+          <a:bodyPr/>
+          <a:lstStyle/>
+          <a:p>
+            <a:fld id="{F30FD791-8B42-4D59-9CF0-F06A56745129}" type="slidenum">
+              <a:rPr lang="en-US" smtClean="0"/>
+              <a:t>6</a:t>
+            </a:fld>
+            <a:endParaRPr lang="en-US"/>
+          </a:p>
+        </p:txBody>
+      </p:sp>
+    </p:spTree>
+    <p:extLst>
+      <p:ext uri="{BB962C8B-B14F-4D97-AF65-F5344CB8AC3E}">
+        <p14:creationId xmlns:p14="http://schemas.microsoft.com/office/powerpoint/2010/main" val="160667156"/>
       </p:ext>
     </p:extLst>
   </p:cSld>
@@ -994,7 +1078,7 @@
           <a:p>
             <a:fld id="{8E15E524-1FF9-4C95-8955-8BC6196503F9}" type="datetimeFigureOut">
               <a:rPr lang="en-US" smtClean="0"/>
-              <a:t>8/12/2021</a:t>
+              <a:t>8/14/2021</a:t>
             </a:fld>
             <a:endParaRPr lang="en-US"/>
           </a:p>
@@ -1192,7 +1276,7 @@
           <a:p>
             <a:fld id="{8E15E524-1FF9-4C95-8955-8BC6196503F9}" type="datetimeFigureOut">
               <a:rPr lang="en-US" smtClean="0"/>
-              <a:t>8/12/2021</a:t>
+              <a:t>8/14/2021</a:t>
             </a:fld>
             <a:endParaRPr lang="en-US"/>
           </a:p>
@@ -1400,7 +1484,7 @@
           <a:p>
             <a:fld id="{8E15E524-1FF9-4C95-8955-8BC6196503F9}" type="datetimeFigureOut">
               <a:rPr lang="en-US" smtClean="0"/>
-              <a:t>8/12/2021</a:t>
+              <a:t>8/14/2021</a:t>
             </a:fld>
             <a:endParaRPr lang="en-US"/>
           </a:p>
@@ -1598,7 +1682,7 @@
           <a:p>
             <a:fld id="{8E15E524-1FF9-4C95-8955-8BC6196503F9}" type="datetimeFigureOut">
               <a:rPr lang="en-US" smtClean="0"/>
-              <a:t>8/12/2021</a:t>
+              <a:t>8/14/2021</a:t>
             </a:fld>
             <a:endParaRPr lang="en-US"/>
           </a:p>
@@ -1873,7 +1957,7 @@
           <a:p>
             <a:fld id="{8E15E524-1FF9-4C95-8955-8BC6196503F9}" type="datetimeFigureOut">
               <a:rPr lang="en-US" smtClean="0"/>
-              <a:t>8/12/2021</a:t>
+              <a:t>8/14/2021</a:t>
             </a:fld>
             <a:endParaRPr lang="en-US"/>
           </a:p>
@@ -2138,7 +2222,7 @@
           <a:p>
             <a:fld id="{8E15E524-1FF9-4C95-8955-8BC6196503F9}" type="datetimeFigureOut">
               <a:rPr lang="en-US" smtClean="0"/>
-              <a:t>8/12/2021</a:t>
+              <a:t>8/14/2021</a:t>
             </a:fld>
             <a:endParaRPr lang="en-US"/>
           </a:p>
@@ -2550,7 +2634,7 @@
           <a:p>
             <a:fld id="{8E15E524-1FF9-4C95-8955-8BC6196503F9}" type="datetimeFigureOut">
               <a:rPr lang="en-US" smtClean="0"/>
-              <a:t>8/12/2021</a:t>
+              <a:t>8/14/2021</a:t>
             </a:fld>
             <a:endParaRPr lang="en-US"/>
           </a:p>
@@ -2691,7 +2775,7 @@
           <a:p>
             <a:fld id="{8E15E524-1FF9-4C95-8955-8BC6196503F9}" type="datetimeFigureOut">
               <a:rPr lang="en-US" smtClean="0"/>
-              <a:t>8/12/2021</a:t>
+              <a:t>8/14/2021</a:t>
             </a:fld>
             <a:endParaRPr lang="en-US"/>
           </a:p>
@@ -2804,7 +2888,7 @@
           <a:p>
             <a:fld id="{8E15E524-1FF9-4C95-8955-8BC6196503F9}" type="datetimeFigureOut">
               <a:rPr lang="en-US" smtClean="0"/>
-              <a:t>8/12/2021</a:t>
+              <a:t>8/14/2021</a:t>
             </a:fld>
             <a:endParaRPr lang="en-US"/>
           </a:p>
@@ -3115,7 +3199,7 @@
           <a:p>
             <a:fld id="{8E15E524-1FF9-4C95-8955-8BC6196503F9}" type="datetimeFigureOut">
               <a:rPr lang="en-US" smtClean="0"/>
-              <a:t>8/12/2021</a:t>
+              <a:t>8/14/2021</a:t>
             </a:fld>
             <a:endParaRPr lang="en-US"/>
           </a:p>
@@ -3403,7 +3487,7 @@
           <a:p>
             <a:fld id="{8E15E524-1FF9-4C95-8955-8BC6196503F9}" type="datetimeFigureOut">
               <a:rPr lang="en-US" smtClean="0"/>
-              <a:t>8/12/2021</a:t>
+              <a:t>8/14/2021</a:t>
             </a:fld>
             <a:endParaRPr lang="en-US"/>
           </a:p>
@@ -3644,7 +3728,7 @@
           <a:p>
             <a:fld id="{8E15E524-1FF9-4C95-8955-8BC6196503F9}" type="datetimeFigureOut">
               <a:rPr lang="en-US" smtClean="0"/>
-              <a:t>8/12/2021</a:t>
+              <a:t>8/14/2021</a:t>
             </a:fld>
             <a:endParaRPr lang="en-US"/>
           </a:p>
@@ -4188,17 +4272,10 @@
           <a:p>
             <a:pPr algn="l"/>
             <a:r>
-              <a:rPr lang="en-US" dirty="0"/>
-              <a:t>Docker </a:t>
+              <a:rPr lang="en-US"/>
+              <a:t>Docker for .NET Developers</a:t>
             </a:r>
-            <a:r>
-              <a:rPr lang="en-US"/>
-              <a:t>for .NET </a:t>
-            </a:r>
-            <a:r>
-              <a:rPr lang="en-US" dirty="0"/>
-              <a:t>Developers</a:t>
-            </a:r>
+            <a:endParaRPr lang="en-US" dirty="0"/>
           </a:p>
         </p:txBody>
       </p:sp>
@@ -4272,8 +4349,8 @@
         </p:blipFill>
         <p:spPr>
           <a:xfrm>
-            <a:off x="716280" y="890115"/>
-            <a:ext cx="5077769" cy="5077769"/>
+            <a:off x="1283207" y="516580"/>
+            <a:ext cx="4396896" cy="4396896"/>
           </a:xfrm>
           <a:prstGeom prst="rect">
             <a:avLst/>
@@ -4341,89 +4418,6 @@
   </p:cSld>
   <p:clrMapOvr>
     <a:overrideClrMapping bg1="dk1" tx1="lt1" bg2="dk2" tx2="lt2" accent1="accent1" accent2="accent2" accent3="accent3" accent4="accent4" accent5="accent5" accent6="accent6" hlink="hlink" folHlink="folHlink"/>
-  </p:clrMapOvr>
-</p:sld>
-</file>
-
-<file path=ppt/slides/slide10.xml><?xml version="1.0" encoding="utf-8"?>
-<p:sld xmlns:a="http://schemas.openxmlformats.org/drawingml/2006/main" xmlns:r="http://schemas.openxmlformats.org/officeDocument/2006/relationships" xmlns:p="http://schemas.openxmlformats.org/presentationml/2006/main">
-  <p:cSld>
-    <p:spTree>
-      <p:nvGrpSpPr>
-        <p:cNvPr id="1" name=""/>
-        <p:cNvGrpSpPr/>
-        <p:nvPr/>
-      </p:nvGrpSpPr>
-      <p:grpSpPr>
-        <a:xfrm>
-          <a:off x="0" y="0"/>
-          <a:ext cx="0" cy="0"/>
-          <a:chOff x="0" y="0"/>
-          <a:chExt cx="0" cy="0"/>
-        </a:xfrm>
-      </p:grpSpPr>
-      <p:sp>
-        <p:nvSpPr>
-          <p:cNvPr id="2" name="Title 1">
-            <a:extLst>
-              <a:ext uri="{FF2B5EF4-FFF2-40B4-BE49-F238E27FC236}">
-                <a16:creationId xmlns:a16="http://schemas.microsoft.com/office/drawing/2014/main" id="{58D25F23-C1E4-40B6-B86F-A11B46A73757}"/>
-              </a:ext>
-            </a:extLst>
-          </p:cNvPr>
-          <p:cNvSpPr>
-            <a:spLocks noGrp="1"/>
-          </p:cNvSpPr>
-          <p:nvPr>
-            <p:ph type="title"/>
-          </p:nvPr>
-        </p:nvSpPr>
-        <p:spPr/>
-        <p:txBody>
-          <a:bodyPr/>
-          <a:lstStyle/>
-          <a:p>
-            <a:r>
-              <a:rPr lang="en-US" dirty="0"/>
-              <a:t>Demo</a:t>
-            </a:r>
-          </a:p>
-        </p:txBody>
-      </p:sp>
-      <p:sp>
-        <p:nvSpPr>
-          <p:cNvPr id="3" name="Content Placeholder 2">
-            <a:extLst>
-              <a:ext uri="{FF2B5EF4-FFF2-40B4-BE49-F238E27FC236}">
-                <a16:creationId xmlns:a16="http://schemas.microsoft.com/office/drawing/2014/main" id="{E690E601-2332-4929-8EA4-2716E4E021A6}"/>
-              </a:ext>
-            </a:extLst>
-          </p:cNvPr>
-          <p:cNvSpPr>
-            <a:spLocks noGrp="1"/>
-          </p:cNvSpPr>
-          <p:nvPr>
-            <p:ph idx="1"/>
-          </p:nvPr>
-        </p:nvSpPr>
-        <p:spPr/>
-        <p:txBody>
-          <a:bodyPr/>
-          <a:lstStyle/>
-          <a:p>
-            <a:endParaRPr lang="en-US"/>
-          </a:p>
-        </p:txBody>
-      </p:sp>
-    </p:spTree>
-    <p:extLst>
-      <p:ext uri="{BB962C8B-B14F-4D97-AF65-F5344CB8AC3E}">
-        <p14:creationId xmlns:p14="http://schemas.microsoft.com/office/powerpoint/2010/main" val="1728309309"/>
-      </p:ext>
-    </p:extLst>
-  </p:cSld>
-  <p:clrMapOvr>
-    <a:masterClrMapping/>
   </p:clrMapOvr>
 </p:sld>
 </file>
@@ -10675,6 +10669,599 @@
 <file path=ppt/slides/slide3.xml><?xml version="1.0" encoding="utf-8"?>
 <p:sld xmlns:a="http://schemas.openxmlformats.org/drawingml/2006/main" xmlns:r="http://schemas.openxmlformats.org/officeDocument/2006/relationships" xmlns:p="http://schemas.openxmlformats.org/presentationml/2006/main">
   <p:cSld>
+    <p:spTree>
+      <p:nvGrpSpPr>
+        <p:cNvPr id="1" name=""/>
+        <p:cNvGrpSpPr/>
+        <p:nvPr/>
+      </p:nvGrpSpPr>
+      <p:grpSpPr>
+        <a:xfrm>
+          <a:off x="0" y="0"/>
+          <a:ext cx="0" cy="0"/>
+          <a:chOff x="0" y="0"/>
+          <a:chExt cx="0" cy="0"/>
+        </a:xfrm>
+      </p:grpSpPr>
+      <p:sp>
+        <p:nvSpPr>
+          <p:cNvPr id="2" name="Title 1">
+            <a:extLst>
+              <a:ext uri="{FF2B5EF4-FFF2-40B4-BE49-F238E27FC236}">
+                <a16:creationId xmlns:a16="http://schemas.microsoft.com/office/drawing/2014/main" id="{869E1D51-ECE9-4EBC-B92C-E77EDFE8366C}"/>
+              </a:ext>
+            </a:extLst>
+          </p:cNvPr>
+          <p:cNvSpPr>
+            <a:spLocks noGrp="1"/>
+          </p:cNvSpPr>
+          <p:nvPr>
+            <p:ph type="title"/>
+          </p:nvPr>
+        </p:nvSpPr>
+        <p:spPr/>
+        <p:txBody>
+          <a:bodyPr/>
+          <a:lstStyle/>
+          <a:p>
+            <a:r>
+              <a:rPr lang="en-US" dirty="0"/>
+              <a:t>Onboarding (optional)</a:t>
+            </a:r>
+          </a:p>
+        </p:txBody>
+      </p:sp>
+      <p:sp>
+        <p:nvSpPr>
+          <p:cNvPr id="3" name="Content Placeholder 2">
+            <a:extLst>
+              <a:ext uri="{FF2B5EF4-FFF2-40B4-BE49-F238E27FC236}">
+                <a16:creationId xmlns:a16="http://schemas.microsoft.com/office/drawing/2014/main" id="{06280920-747B-46D2-A00E-E55C3D6AF81E}"/>
+              </a:ext>
+            </a:extLst>
+          </p:cNvPr>
+          <p:cNvSpPr>
+            <a:spLocks noGrp="1"/>
+          </p:cNvSpPr>
+          <p:nvPr>
+            <p:ph idx="1"/>
+          </p:nvPr>
+        </p:nvSpPr>
+        <p:spPr/>
+        <p:txBody>
+          <a:bodyPr/>
+          <a:lstStyle/>
+          <a:p>
+            <a:r>
+              <a:rPr lang="en-US" dirty="0">
+                <a:hlinkClick r:id="rId3"/>
+              </a:rPr>
+              <a:t>https://github.com/dvdmrk/DockerPresentation/tree/main/Scripts</a:t>
+            </a:r>
+            <a:endParaRPr lang="en-US" dirty="0"/>
+          </a:p>
+          <a:p>
+            <a:r>
+              <a:rPr lang="en-US" dirty="0"/>
+              <a:t>Install Chocolatey</a:t>
+            </a:r>
+          </a:p>
+          <a:p>
+            <a:r>
+              <a:rPr lang="en-US" dirty="0"/>
+              <a:t>Install Docker Desktop</a:t>
+            </a:r>
+          </a:p>
+          <a:p>
+            <a:pPr lvl="1"/>
+            <a:r>
+              <a:rPr lang="en-US" dirty="0"/>
+              <a:t>This includes the docker cli</a:t>
+            </a:r>
+          </a:p>
+          <a:p>
+            <a:pPr lvl="1"/>
+            <a:r>
+              <a:rPr lang="en-US" dirty="0"/>
+              <a:t>All other dependencies are optional and encouraged</a:t>
+            </a:r>
+          </a:p>
+          <a:p>
+            <a:pPr lvl="1"/>
+            <a:r>
+              <a:rPr lang="en-US" dirty="0"/>
+              <a:t>Application dependencies will be installed on the container images</a:t>
+            </a:r>
+          </a:p>
+          <a:p>
+            <a:r>
+              <a:rPr lang="en-US" dirty="0"/>
+              <a:t>You will be able to access the DB through Heidi SQL or SSMS</a:t>
+            </a:r>
+          </a:p>
+          <a:p>
+            <a:pPr marL="0" indent="0">
+              <a:buNone/>
+            </a:pPr>
+            <a:r>
+              <a:rPr lang="en-US" b="1" dirty="0"/>
+              <a:t>PRO TIP: Enable Windows Sandbox to avoid version conflicts and all changes will be isolated and erased after the VM is closed.</a:t>
+            </a:r>
+          </a:p>
+        </p:txBody>
+      </p:sp>
+    </p:spTree>
+    <p:extLst>
+      <p:ext uri="{BB962C8B-B14F-4D97-AF65-F5344CB8AC3E}">
+        <p14:creationId xmlns:p14="http://schemas.microsoft.com/office/powerpoint/2010/main" val="2249137580"/>
+      </p:ext>
+    </p:extLst>
+  </p:cSld>
+  <p:clrMapOvr>
+    <a:masterClrMapping/>
+  </p:clrMapOvr>
+</p:sld>
+</file>
+
+<file path=ppt/slides/slide4.xml><?xml version="1.0" encoding="utf-8"?>
+<p:sld xmlns:a="http://schemas.openxmlformats.org/drawingml/2006/main" xmlns:r="http://schemas.openxmlformats.org/officeDocument/2006/relationships" xmlns:p="http://schemas.openxmlformats.org/presentationml/2006/main">
+  <p:cSld>
+    <p:spTree>
+      <p:nvGrpSpPr>
+        <p:cNvPr id="1" name=""/>
+        <p:cNvGrpSpPr/>
+        <p:nvPr/>
+      </p:nvGrpSpPr>
+      <p:grpSpPr>
+        <a:xfrm>
+          <a:off x="0" y="0"/>
+          <a:ext cx="0" cy="0"/>
+          <a:chOff x="0" y="0"/>
+          <a:chExt cx="0" cy="0"/>
+        </a:xfrm>
+      </p:grpSpPr>
+      <p:sp>
+        <p:nvSpPr>
+          <p:cNvPr id="2" name="Title 1">
+            <a:extLst>
+              <a:ext uri="{FF2B5EF4-FFF2-40B4-BE49-F238E27FC236}">
+                <a16:creationId xmlns:a16="http://schemas.microsoft.com/office/drawing/2014/main" id="{063810A1-0D35-4E82-A41F-A3915B85E251}"/>
+              </a:ext>
+            </a:extLst>
+          </p:cNvPr>
+          <p:cNvSpPr>
+            <a:spLocks noGrp="1"/>
+          </p:cNvSpPr>
+          <p:nvPr>
+            <p:ph type="title"/>
+          </p:nvPr>
+        </p:nvSpPr>
+        <p:spPr/>
+        <p:txBody>
+          <a:bodyPr/>
+          <a:lstStyle/>
+          <a:p>
+            <a:r>
+              <a:rPr lang="en-US" dirty="0"/>
+              <a:t>Onboarding Tools</a:t>
+            </a:r>
+          </a:p>
+        </p:txBody>
+      </p:sp>
+      <p:sp>
+        <p:nvSpPr>
+          <p:cNvPr id="3" name="Content Placeholder 2">
+            <a:extLst>
+              <a:ext uri="{FF2B5EF4-FFF2-40B4-BE49-F238E27FC236}">
+                <a16:creationId xmlns:a16="http://schemas.microsoft.com/office/drawing/2014/main" id="{775F68CE-C172-4FF8-84CF-262717F87EB6}"/>
+              </a:ext>
+            </a:extLst>
+          </p:cNvPr>
+          <p:cNvSpPr>
+            <a:spLocks noGrp="1"/>
+          </p:cNvSpPr>
+          <p:nvPr>
+            <p:ph idx="1"/>
+          </p:nvPr>
+        </p:nvSpPr>
+        <p:spPr/>
+        <p:txBody>
+          <a:bodyPr/>
+          <a:lstStyle/>
+          <a:p>
+            <a:r>
+              <a:rPr lang="en-US" dirty="0">
+                <a:hlinkClick r:id="rId2"/>
+              </a:rPr>
+              <a:t>https://github.com/dvdmrk/DockerPresentation/blob/main/Scripts/docker-onboarding.ps1</a:t>
+            </a:r>
+            <a:endParaRPr lang="en-US" dirty="0"/>
+          </a:p>
+          <a:p>
+            <a:r>
+              <a:rPr lang="en-US" dirty="0"/>
+              <a:t>This onboarding file is for a brand-new machine, you might not need everything.</a:t>
+            </a:r>
+          </a:p>
+          <a:p>
+            <a:r>
+              <a:rPr lang="en-US" dirty="0"/>
+              <a:t>Running </a:t>
+            </a:r>
+            <a:r>
+              <a:rPr lang="en-US" dirty="0" err="1"/>
+              <a:t>linux</a:t>
+            </a:r>
+            <a:r>
+              <a:rPr lang="en-US" dirty="0"/>
+              <a:t> containers requires a </a:t>
+            </a:r>
+            <a:r>
+              <a:rPr lang="en-US" dirty="0" err="1"/>
+              <a:t>linux</a:t>
+            </a:r>
+            <a:r>
+              <a:rPr lang="en-US" dirty="0"/>
+              <a:t> subsystem because </a:t>
+            </a:r>
+            <a:r>
+              <a:rPr lang="en-US" dirty="0" err="1"/>
+              <a:t>linux</a:t>
+            </a:r>
+            <a:r>
+              <a:rPr lang="en-US" dirty="0"/>
+              <a:t> containers cannot share a kernel with windows, this means windows 10 pro/ enterprise users should enable Hyper-V.</a:t>
+            </a:r>
+          </a:p>
+          <a:p>
+            <a:endParaRPr lang="en-US" dirty="0"/>
+          </a:p>
+        </p:txBody>
+      </p:sp>
+    </p:spTree>
+    <p:extLst>
+      <p:ext uri="{BB962C8B-B14F-4D97-AF65-F5344CB8AC3E}">
+        <p14:creationId xmlns:p14="http://schemas.microsoft.com/office/powerpoint/2010/main" val="1107585896"/>
+      </p:ext>
+    </p:extLst>
+  </p:cSld>
+  <p:clrMapOvr>
+    <a:masterClrMapping/>
+  </p:clrMapOvr>
+</p:sld>
+</file>
+
+<file path=ppt/slides/slide5.xml><?xml version="1.0" encoding="utf-8"?>
+<p:sld xmlns:a="http://schemas.openxmlformats.org/drawingml/2006/main" xmlns:r="http://schemas.openxmlformats.org/officeDocument/2006/relationships" xmlns:p="http://schemas.openxmlformats.org/presentationml/2006/main">
+  <p:cSld>
+    <p:spTree>
+      <p:nvGrpSpPr>
+        <p:cNvPr id="1" name=""/>
+        <p:cNvGrpSpPr/>
+        <p:nvPr/>
+      </p:nvGrpSpPr>
+      <p:grpSpPr>
+        <a:xfrm>
+          <a:off x="0" y="0"/>
+          <a:ext cx="0" cy="0"/>
+          <a:chOff x="0" y="0"/>
+          <a:chExt cx="0" cy="0"/>
+        </a:xfrm>
+      </p:grpSpPr>
+      <p:sp>
+        <p:nvSpPr>
+          <p:cNvPr id="2" name="Title 1">
+            <a:extLst>
+              <a:ext uri="{FF2B5EF4-FFF2-40B4-BE49-F238E27FC236}">
+                <a16:creationId xmlns:a16="http://schemas.microsoft.com/office/drawing/2014/main" id="{1A9B2EEB-5392-4840-B581-A317F66C00B0}"/>
+              </a:ext>
+            </a:extLst>
+          </p:cNvPr>
+          <p:cNvSpPr>
+            <a:spLocks noGrp="1"/>
+          </p:cNvSpPr>
+          <p:nvPr>
+            <p:ph type="title"/>
+          </p:nvPr>
+        </p:nvSpPr>
+        <p:spPr/>
+        <p:txBody>
+          <a:bodyPr/>
+          <a:lstStyle/>
+          <a:p>
+            <a:r>
+              <a:rPr lang="en-US" dirty="0"/>
+              <a:t>What is Docker?</a:t>
+            </a:r>
+          </a:p>
+        </p:txBody>
+      </p:sp>
+      <p:sp>
+        <p:nvSpPr>
+          <p:cNvPr id="3" name="Content Placeholder 2">
+            <a:extLst>
+              <a:ext uri="{FF2B5EF4-FFF2-40B4-BE49-F238E27FC236}">
+                <a16:creationId xmlns:a16="http://schemas.microsoft.com/office/drawing/2014/main" id="{EC1CB3B1-5D88-4098-B1DD-1DFCDE848F9E}"/>
+              </a:ext>
+            </a:extLst>
+          </p:cNvPr>
+          <p:cNvSpPr>
+            <a:spLocks noGrp="1"/>
+          </p:cNvSpPr>
+          <p:nvPr>
+            <p:ph idx="1"/>
+          </p:nvPr>
+        </p:nvSpPr>
+        <p:spPr/>
+        <p:txBody>
+          <a:bodyPr>
+            <a:normAutofit/>
+          </a:bodyPr>
+          <a:lstStyle/>
+          <a:p>
+            <a:r>
+              <a:rPr lang="en-US" dirty="0"/>
+              <a:t>Docker is an open-source containerization platform. </a:t>
+            </a:r>
+          </a:p>
+          <a:p>
+            <a:r>
+              <a:rPr lang="en-US" dirty="0"/>
+              <a:t>It enables developers to package applications into containers</a:t>
+            </a:r>
+          </a:p>
+          <a:p>
+            <a:pPr lvl="1"/>
+            <a:r>
+              <a:rPr lang="en-US" dirty="0"/>
+              <a:t>Containers are standardized executable components called </a:t>
+            </a:r>
+            <a:r>
+              <a:rPr lang="en-US" b="1" dirty="0"/>
+              <a:t>images.</a:t>
+            </a:r>
+          </a:p>
+          <a:p>
+            <a:pPr lvl="1"/>
+            <a:r>
+              <a:rPr lang="en-US" dirty="0"/>
+              <a:t>Containers are comprised of application source code and the the system libraries/ dependencies required to run that code in any environment.</a:t>
+            </a:r>
+          </a:p>
+          <a:p>
+            <a:pPr lvl="2"/>
+            <a:r>
+              <a:rPr lang="en-US" dirty="0"/>
+              <a:t>This makes it easy for us to develop and deploy apps in a way that includes dependencies.</a:t>
+            </a:r>
+          </a:p>
+          <a:p>
+            <a:pPr lvl="2"/>
+            <a:r>
+              <a:rPr lang="en-US" dirty="0"/>
+              <a:t>Because dependencies/ libraries/ and source are preconfigured and coded- they will run the same no matter where they are deployed to or what machine they’re on.</a:t>
+            </a:r>
+          </a:p>
+          <a:p>
+            <a:r>
+              <a:rPr lang="en-US" b="1" dirty="0"/>
+              <a:t>BENEFITS:</a:t>
+            </a:r>
+            <a:r>
+              <a:rPr lang="en-US" dirty="0"/>
+              <a:t> system agnostic, simpler to use, less work to develop, easier to maintain and deploy.</a:t>
+            </a:r>
+          </a:p>
+        </p:txBody>
+      </p:sp>
+    </p:spTree>
+    <p:extLst>
+      <p:ext uri="{BB962C8B-B14F-4D97-AF65-F5344CB8AC3E}">
+        <p14:creationId xmlns:p14="http://schemas.microsoft.com/office/powerpoint/2010/main" val="3648995872"/>
+      </p:ext>
+    </p:extLst>
+  </p:cSld>
+  <p:clrMapOvr>
+    <a:masterClrMapping/>
+  </p:clrMapOvr>
+</p:sld>
+</file>
+
+<file path=ppt/slides/slide6.xml><?xml version="1.0" encoding="utf-8"?>
+<p:sld xmlns:a="http://schemas.openxmlformats.org/drawingml/2006/main" xmlns:r="http://schemas.openxmlformats.org/officeDocument/2006/relationships" xmlns:p="http://schemas.openxmlformats.org/presentationml/2006/main">
+  <p:cSld>
+    <p:spTree>
+      <p:nvGrpSpPr>
+        <p:cNvPr id="1" name=""/>
+        <p:cNvGrpSpPr/>
+        <p:nvPr/>
+      </p:nvGrpSpPr>
+      <p:grpSpPr>
+        <a:xfrm>
+          <a:off x="0" y="0"/>
+          <a:ext cx="0" cy="0"/>
+          <a:chOff x="0" y="0"/>
+          <a:chExt cx="0" cy="0"/>
+        </a:xfrm>
+      </p:grpSpPr>
+      <p:sp>
+        <p:nvSpPr>
+          <p:cNvPr id="2" name="Title 1">
+            <a:extLst>
+              <a:ext uri="{FF2B5EF4-FFF2-40B4-BE49-F238E27FC236}">
+                <a16:creationId xmlns:a16="http://schemas.microsoft.com/office/drawing/2014/main" id="{8F379352-BA7A-4C4B-9F82-7E014A9F87BD}"/>
+              </a:ext>
+            </a:extLst>
+          </p:cNvPr>
+          <p:cNvSpPr>
+            <a:spLocks noGrp="1"/>
+          </p:cNvSpPr>
+          <p:nvPr>
+            <p:ph type="title"/>
+          </p:nvPr>
+        </p:nvSpPr>
+        <p:spPr/>
+        <p:txBody>
+          <a:bodyPr/>
+          <a:lstStyle/>
+          <a:p>
+            <a:r>
+              <a:rPr lang="en-US" dirty="0"/>
+              <a:t>Containers Explained</a:t>
+            </a:r>
+          </a:p>
+        </p:txBody>
+      </p:sp>
+      <p:sp>
+        <p:nvSpPr>
+          <p:cNvPr id="3" name="Content Placeholder 2">
+            <a:extLst>
+              <a:ext uri="{FF2B5EF4-FFF2-40B4-BE49-F238E27FC236}">
+                <a16:creationId xmlns:a16="http://schemas.microsoft.com/office/drawing/2014/main" id="{D08B67B3-DF9F-4BAD-B2D2-87433EFF1D1B}"/>
+              </a:ext>
+            </a:extLst>
+          </p:cNvPr>
+          <p:cNvSpPr>
+            <a:spLocks noGrp="1"/>
+          </p:cNvSpPr>
+          <p:nvPr>
+            <p:ph idx="1"/>
+          </p:nvPr>
+        </p:nvSpPr>
+        <p:spPr/>
+        <p:txBody>
+          <a:bodyPr>
+            <a:normAutofit lnSpcReduction="10000"/>
+          </a:bodyPr>
+          <a:lstStyle/>
+          <a:p>
+            <a:r>
+              <a:rPr lang="en-US" dirty="0"/>
+              <a:t>Infrastructure - Laptop</a:t>
+            </a:r>
+          </a:p>
+          <a:p>
+            <a:r>
+              <a:rPr lang="en-US" dirty="0"/>
+              <a:t>Host Operating System</a:t>
+            </a:r>
+          </a:p>
+          <a:p>
+            <a:pPr lvl="1"/>
+            <a:r>
+              <a:rPr lang="en-US" dirty="0"/>
+              <a:t>Windows 10 Pro – Hyper-V Provided WSL</a:t>
+            </a:r>
+          </a:p>
+          <a:p>
+            <a:r>
+              <a:rPr lang="en-US" dirty="0"/>
+              <a:t>Docker – Containerization Platform </a:t>
+            </a:r>
+          </a:p>
+          <a:p>
+            <a:r>
+              <a:rPr lang="en-US" dirty="0"/>
+              <a:t>App A - API Project</a:t>
+            </a:r>
+          </a:p>
+          <a:p>
+            <a:r>
+              <a:rPr lang="en-US" dirty="0"/>
+              <a:t>App B - Angular Project</a:t>
+            </a:r>
+          </a:p>
+          <a:p>
+            <a:r>
+              <a:rPr lang="en-US" dirty="0"/>
+              <a:t>App C – PostgreSQL</a:t>
+            </a:r>
+          </a:p>
+          <a:p>
+            <a:r>
+              <a:rPr lang="en-US" dirty="0"/>
+              <a:t>App D – SQL</a:t>
+            </a:r>
+          </a:p>
+          <a:p>
+            <a:r>
+              <a:rPr lang="en-US" dirty="0"/>
+              <a:t>App E &amp; F – GO, Node, Dynamo </a:t>
+            </a:r>
+          </a:p>
+          <a:p>
+            <a:pPr lvl="1"/>
+            <a:endParaRPr lang="en-US" dirty="0"/>
+          </a:p>
+          <a:p>
+            <a:pPr lvl="1"/>
+            <a:endParaRPr lang="en-US" dirty="0"/>
+          </a:p>
+        </p:txBody>
+      </p:sp>
+      <p:pic>
+        <p:nvPicPr>
+          <p:cNvPr id="1026" name="Picture 2">
+            <a:extLst>
+              <a:ext uri="{FF2B5EF4-FFF2-40B4-BE49-F238E27FC236}">
+                <a16:creationId xmlns:a16="http://schemas.microsoft.com/office/drawing/2014/main" id="{864E0C64-08AF-44BA-B224-49E4D04CE629}"/>
+              </a:ext>
+            </a:extLst>
+          </p:cNvPr>
+          <p:cNvPicPr>
+            <a:picLocks noChangeAspect="1" noChangeArrowheads="1"/>
+          </p:cNvPicPr>
+          <p:nvPr/>
+        </p:nvPicPr>
+        <p:blipFill>
+          <a:blip r:embed="rId3">
+            <a:extLst>
+              <a:ext uri="{28A0092B-C50C-407E-A947-70E740481C1C}">
+                <a14:useLocalDpi xmlns:a14="http://schemas.microsoft.com/office/drawing/2010/main" val="0"/>
+              </a:ext>
+            </a:extLst>
+          </a:blip>
+          <a:srcRect/>
+          <a:stretch>
+            <a:fillRect/>
+          </a:stretch>
+        </p:blipFill>
+        <p:spPr bwMode="auto">
+          <a:xfrm>
+            <a:off x="4389748" y="0"/>
+            <a:ext cx="7920037" cy="6858000"/>
+          </a:xfrm>
+          <a:prstGeom prst="rect">
+            <a:avLst/>
+          </a:prstGeom>
+          <a:noFill/>
+          <a:extLst>
+            <a:ext uri="{909E8E84-426E-40DD-AFC4-6F175D3DCCD1}">
+              <a14:hiddenFill xmlns:a14="http://schemas.microsoft.com/office/drawing/2010/main">
+                <a:solidFill>
+                  <a:srgbClr val="FFFFFF"/>
+                </a:solidFill>
+              </a14:hiddenFill>
+            </a:ext>
+          </a:extLst>
+        </p:spPr>
+      </p:pic>
+    </p:spTree>
+    <p:extLst>
+      <p:ext uri="{BB962C8B-B14F-4D97-AF65-F5344CB8AC3E}">
+        <p14:creationId xmlns:p14="http://schemas.microsoft.com/office/powerpoint/2010/main" val="2304163620"/>
+      </p:ext>
+    </p:extLst>
+  </p:cSld>
+  <p:clrMapOvr>
+    <a:masterClrMapping/>
+  </p:clrMapOvr>
+</p:sld>
+</file>
+
+<file path=ppt/slides/slide7.xml><?xml version="1.0" encoding="utf-8"?>
+<p:sld xmlns:a="http://schemas.openxmlformats.org/drawingml/2006/main" xmlns:r="http://schemas.openxmlformats.org/officeDocument/2006/relationships" xmlns:p="http://schemas.openxmlformats.org/presentationml/2006/main">
+  <p:cSld>
     <p:bg>
       <p:bgPr>
         <a:solidFill>
@@ -10697,137 +11284,12 @@
           <a:chExt cx="0" cy="0"/>
         </a:xfrm>
       </p:grpSpPr>
-      <p:pic>
-        <p:nvPicPr>
-          <p:cNvPr id="5" name="Picture 4" descr="A close-up of a lemon&#10;&#10;Description automatically generated with medium confidence">
+      <p:sp useBgFill="1">
+        <p:nvSpPr>
+          <p:cNvPr id="73" name="Rectangle 72">
             <a:extLst>
               <a:ext uri="{FF2B5EF4-FFF2-40B4-BE49-F238E27FC236}">
-                <a16:creationId xmlns:a16="http://schemas.microsoft.com/office/drawing/2014/main" id="{99943BAC-B494-4DD5-BACB-F65F96F9E71C}"/>
-              </a:ext>
-            </a:extLst>
-          </p:cNvPr>
-          <p:cNvPicPr>
-            <a:picLocks noChangeAspect="1"/>
-          </p:cNvPicPr>
-          <p:nvPr/>
-        </p:nvPicPr>
-        <p:blipFill rotWithShape="1">
-          <a:blip r:embed="rId3">
-            <a:duotone>
-              <a:prstClr val="black"/>
-              <a:schemeClr val="tx2">
-                <a:tint val="45000"/>
-                <a:satMod val="400000"/>
-              </a:schemeClr>
-            </a:duotone>
-            <a:alphaModFix amt="35000"/>
-            <a:extLst>
-              <a:ext uri="{28A0092B-C50C-407E-A947-70E740481C1C}">
-                <a14:useLocalDpi xmlns:a14="http://schemas.microsoft.com/office/drawing/2010/main" val="0"/>
-              </a:ext>
-            </a:extLst>
-          </a:blip>
-          <a:srcRect t="22055" b="21712"/>
-          <a:stretch/>
-        </p:blipFill>
-        <p:spPr>
-          <a:xfrm>
-            <a:off x="-19" y="10"/>
-            <a:ext cx="12192000" cy="6855948"/>
-          </a:xfrm>
-          <a:prstGeom prst="rect">
-            <a:avLst/>
-          </a:prstGeom>
-        </p:spPr>
-      </p:pic>
-      <p:sp>
-        <p:nvSpPr>
-          <p:cNvPr id="2" name="Title 1">
-            <a:extLst>
-              <a:ext uri="{FF2B5EF4-FFF2-40B4-BE49-F238E27FC236}">
-                <a16:creationId xmlns:a16="http://schemas.microsoft.com/office/drawing/2014/main" id="{E58DCCEC-ECD7-4646-8543-6C9B0AF3BA9D}"/>
-              </a:ext>
-            </a:extLst>
-          </p:cNvPr>
-          <p:cNvSpPr>
-            <a:spLocks noGrp="1"/>
-          </p:cNvSpPr>
-          <p:nvPr>
-            <p:ph type="title"/>
-          </p:nvPr>
-        </p:nvSpPr>
-        <p:spPr>
-          <a:xfrm>
-            <a:off x="801098" y="1396289"/>
-            <a:ext cx="5277333" cy="1325563"/>
-          </a:xfrm>
-        </p:spPr>
-        <p:txBody>
-          <a:bodyPr>
-            <a:normAutofit/>
-          </a:bodyPr>
-          <a:lstStyle/>
-          <a:p>
-            <a:r>
-              <a:rPr lang="en-US" dirty="0"/>
-              <a:t>Group Exercise #1</a:t>
-            </a:r>
-          </a:p>
-        </p:txBody>
-      </p:sp>
-      <p:sp>
-        <p:nvSpPr>
-          <p:cNvPr id="3" name="Content Placeholder 2">
-            <a:extLst>
-              <a:ext uri="{FF2B5EF4-FFF2-40B4-BE49-F238E27FC236}">
-                <a16:creationId xmlns:a16="http://schemas.microsoft.com/office/drawing/2014/main" id="{9E5CF653-0EC3-4E44-861A-DE671FA27B0F}"/>
-              </a:ext>
-            </a:extLst>
-          </p:cNvPr>
-          <p:cNvSpPr>
-            <a:spLocks noGrp="1"/>
-          </p:cNvSpPr>
-          <p:nvPr>
-            <p:ph idx="1"/>
-          </p:nvPr>
-        </p:nvSpPr>
-        <p:spPr>
-          <a:xfrm>
-            <a:off x="805543" y="2871982"/>
-            <a:ext cx="5272888" cy="3181684"/>
-          </a:xfrm>
-        </p:spPr>
-        <p:txBody>
-          <a:bodyPr anchor="t">
-            <a:normAutofit/>
-          </a:bodyPr>
-          <a:lstStyle/>
-          <a:p>
-            <a:r>
-              <a:rPr lang="en-US" sz="1800"/>
-              <a:t>Have you heard of docker?</a:t>
-            </a:r>
-          </a:p>
-          <a:p>
-            <a:r>
-              <a:rPr lang="en-US" sz="1800"/>
-              <a:t>Are you using docker?</a:t>
-            </a:r>
-          </a:p>
-          <a:p>
-            <a:r>
-              <a:rPr lang="en-US" sz="1800"/>
-              <a:t>How complex is docker?</a:t>
-            </a:r>
-          </a:p>
-        </p:txBody>
-      </p:sp>
-      <p:sp>
-        <p:nvSpPr>
-          <p:cNvPr id="135" name="Freeform 49">
-            <a:extLst>
-              <a:ext uri="{FF2B5EF4-FFF2-40B4-BE49-F238E27FC236}">
-                <a16:creationId xmlns:a16="http://schemas.microsoft.com/office/drawing/2014/main" id="{EF9B8DF2-C3F5-49A2-94D2-F7B65A0F1F15}"/>
+                <a16:creationId xmlns:a16="http://schemas.microsoft.com/office/drawing/2014/main" id="{385E1BDC-A9B0-4A87-82E3-F3187F69A802}"/>
               </a:ext>
               <a:ext uri="{C183D7F6-B498-43B3-948B-1728B52AA6E4}">
                 <adec:decorative xmlns:adec="http://schemas.microsoft.com/office/drawing/2017/decorative" val="1"/>
@@ -10846,126 +11308,14 @@
           </p:nvPr>
         </p:nvSpPr>
         <p:spPr>
-          <a:xfrm flipH="1">
-            <a:off x="6713914" y="581159"/>
-            <a:ext cx="5478085" cy="6276841"/>
+          <a:xfrm>
+            <a:off x="0" y="0"/>
+            <a:ext cx="12192000" cy="6858000"/>
           </a:xfrm>
-          <a:custGeom>
+          <a:prstGeom prst="rect">
             <a:avLst/>
-            <a:gdLst>
-              <a:gd name="connsiteX0" fmla="*/ 2178155 w 5478085"/>
-              <a:gd name="connsiteY0" fmla="*/ 0 h 6276841"/>
-              <a:gd name="connsiteX1" fmla="*/ 5478085 w 5478085"/>
-              <a:gd name="connsiteY1" fmla="*/ 3299930 h 6276841"/>
-              <a:gd name="connsiteX2" fmla="*/ 3751098 w 5478085"/>
-              <a:gd name="connsiteY2" fmla="*/ 6201577 h 6276841"/>
-              <a:gd name="connsiteX3" fmla="*/ 3594858 w 5478085"/>
-              <a:gd name="connsiteY3" fmla="*/ 6276841 h 6276841"/>
-              <a:gd name="connsiteX4" fmla="*/ 761453 w 5478085"/>
-              <a:gd name="connsiteY4" fmla="*/ 6276841 h 6276841"/>
-              <a:gd name="connsiteX5" fmla="*/ 605213 w 5478085"/>
-              <a:gd name="connsiteY5" fmla="*/ 6201577 h 6276841"/>
-              <a:gd name="connsiteX6" fmla="*/ 79093 w 5478085"/>
-              <a:gd name="connsiteY6" fmla="*/ 5846317 h 6276841"/>
-              <a:gd name="connsiteX7" fmla="*/ 0 w 5478085"/>
-              <a:gd name="connsiteY7" fmla="*/ 5774432 h 6276841"/>
-              <a:gd name="connsiteX8" fmla="*/ 0 w 5478085"/>
-              <a:gd name="connsiteY8" fmla="*/ 825429 h 6276841"/>
-              <a:gd name="connsiteX9" fmla="*/ 79093 w 5478085"/>
-              <a:gd name="connsiteY9" fmla="*/ 753544 h 6276841"/>
-              <a:gd name="connsiteX10" fmla="*/ 2178155 w 5478085"/>
-              <a:gd name="connsiteY10" fmla="*/ 0 h 6276841"/>
-            </a:gdLst>
-            <a:ahLst/>
-            <a:cxnLst>
-              <a:cxn ang="0">
-                <a:pos x="connsiteX0" y="connsiteY0"/>
-              </a:cxn>
-              <a:cxn ang="0">
-                <a:pos x="connsiteX1" y="connsiteY1"/>
-              </a:cxn>
-              <a:cxn ang="0">
-                <a:pos x="connsiteX2" y="connsiteY2"/>
-              </a:cxn>
-              <a:cxn ang="0">
-                <a:pos x="connsiteX3" y="connsiteY3"/>
-              </a:cxn>
-              <a:cxn ang="0">
-                <a:pos x="connsiteX4" y="connsiteY4"/>
-              </a:cxn>
-              <a:cxn ang="0">
-                <a:pos x="connsiteX5" y="connsiteY5"/>
-              </a:cxn>
-              <a:cxn ang="0">
-                <a:pos x="connsiteX6" y="connsiteY6"/>
-              </a:cxn>
-              <a:cxn ang="0">
-                <a:pos x="connsiteX7" y="connsiteY7"/>
-              </a:cxn>
-              <a:cxn ang="0">
-                <a:pos x="connsiteX8" y="connsiteY8"/>
-              </a:cxn>
-              <a:cxn ang="0">
-                <a:pos x="connsiteX9" y="connsiteY9"/>
-              </a:cxn>
-              <a:cxn ang="0">
-                <a:pos x="connsiteX10" y="connsiteY10"/>
-              </a:cxn>
-            </a:cxnLst>
-            <a:rect l="l" t="t" r="r" b="b"/>
-            <a:pathLst>
-              <a:path w="5478085" h="6276841">
-                <a:moveTo>
-                  <a:pt x="2178155" y="0"/>
-                </a:moveTo>
-                <a:cubicBezTo>
-                  <a:pt x="4000656" y="0"/>
-                  <a:pt x="5478085" y="1477429"/>
-                  <a:pt x="5478085" y="3299930"/>
-                </a:cubicBezTo>
-                <a:cubicBezTo>
-                  <a:pt x="5478085" y="4552900"/>
-                  <a:pt x="4779769" y="5642769"/>
-                  <a:pt x="3751098" y="6201577"/>
-                </a:cubicBezTo>
-                <a:lnTo>
-                  <a:pt x="3594858" y="6276841"/>
-                </a:lnTo>
-                <a:lnTo>
-                  <a:pt x="761453" y="6276841"/>
-                </a:lnTo>
-                <a:lnTo>
-                  <a:pt x="605213" y="6201577"/>
-                </a:lnTo>
-                <a:cubicBezTo>
-                  <a:pt x="418182" y="6099975"/>
-                  <a:pt x="242071" y="5980818"/>
-                  <a:pt x="79093" y="5846317"/>
-                </a:cubicBezTo>
-                <a:lnTo>
-                  <a:pt x="0" y="5774432"/>
-                </a:lnTo>
-                <a:lnTo>
-                  <a:pt x="0" y="825429"/>
-                </a:lnTo>
-                <a:lnTo>
-                  <a:pt x="79093" y="753544"/>
-                </a:lnTo>
-                <a:cubicBezTo>
-                  <a:pt x="649516" y="282789"/>
-                  <a:pt x="1380811" y="0"/>
-                  <a:pt x="2178155" y="0"/>
-                </a:cubicBezTo>
-                <a:close/>
-              </a:path>
-            </a:pathLst>
-          </a:custGeom>
-          <a:solidFill>
-            <a:srgbClr val="FFFFFF">
-              <a:alpha val="80000"/>
-            </a:srgbClr>
-          </a:solidFill>
-          <a:ln w="31750">
+          </a:prstGeom>
+          <a:ln>
             <a:noFill/>
           </a:ln>
         </p:spPr>
@@ -10986,9 +11336,77 @@
           </a:fontRef>
         </p:style>
         <p:txBody>
-          <a:bodyPr wrap="square" rtlCol="0" anchor="ctr">
-            <a:noAutofit/>
-          </a:bodyPr>
+          <a:bodyPr rtlCol="0" anchor="ctr"/>
+          <a:lstStyle/>
+          <a:p>
+            <a:pPr algn="ctr"/>
+            <a:endParaRPr lang="en-US"/>
+          </a:p>
+        </p:txBody>
+      </p:sp>
+      <p:sp useBgFill="1">
+        <p:nvSpPr>
+          <p:cNvPr id="75" name="Rectangle 74">
+            <a:extLst>
+              <a:ext uri="{FF2B5EF4-FFF2-40B4-BE49-F238E27FC236}">
+                <a16:creationId xmlns:a16="http://schemas.microsoft.com/office/drawing/2014/main" id="{0990C621-3B8B-4820-8328-D47EF7CE823C}"/>
+              </a:ext>
+              <a:ext uri="{C183D7F6-B498-43B3-948B-1728B52AA6E4}">
+                <adec:decorative xmlns:adec="http://schemas.microsoft.com/office/drawing/2017/decorative" val="1"/>
+              </a:ext>
+            </a:extLst>
+          </p:cNvPr>
+          <p:cNvSpPr>
+            <a:spLocks noGrp="1" noRot="1" noChangeAspect="1" noMove="1" noResize="1" noEditPoints="1" noAdjustHandles="1" noChangeArrowheads="1" noChangeShapeType="1" noTextEdit="1"/>
+          </p:cNvSpPr>
+          <p:nvPr>
+            <p:extLst>
+              <p:ext uri="{386F3935-93C4-4BCD-93E2-E3B085C9AB24}">
+                <p16:designElem xmlns:p16="http://schemas.microsoft.com/office/powerpoint/2015/main" val="1"/>
+              </p:ext>
+            </p:extLst>
+          </p:nvPr>
+        </p:nvSpPr>
+        <p:spPr>
+          <a:xfrm>
+            <a:off x="554416" y="365125"/>
+            <a:ext cx="11167447" cy="2089317"/>
+          </a:xfrm>
+          <a:prstGeom prst="rect">
+            <a:avLst/>
+          </a:prstGeom>
+          <a:ln w="12700">
+            <a:solidFill>
+              <a:srgbClr val="DEDEDE"/>
+            </a:solidFill>
+          </a:ln>
+          <a:effectLst>
+            <a:outerShdw blurRad="50800" dist="38100" dir="2700000" algn="tl" rotWithShape="0">
+              <a:schemeClr val="bg2">
+                <a:lumMod val="85000"/>
+                <a:alpha val="50000"/>
+              </a:schemeClr>
+            </a:outerShdw>
+          </a:effectLst>
+        </p:spPr>
+        <p:style>
+          <a:lnRef idx="2">
+            <a:schemeClr val="accent1">
+              <a:shade val="50000"/>
+            </a:schemeClr>
+          </a:lnRef>
+          <a:fillRef idx="1">
+            <a:schemeClr val="accent1"/>
+          </a:fillRef>
+          <a:effectRef idx="0">
+            <a:schemeClr val="accent1"/>
+          </a:effectRef>
+          <a:fontRef idx="minor">
+            <a:schemeClr val="lt1"/>
+          </a:fontRef>
+        </p:style>
+        <p:txBody>
+          <a:bodyPr rtlCol="0" anchor="ctr"/>
           <a:lstStyle/>
           <a:p>
             <a:pPr marL="0" marR="0" lvl="0" indent="0" algn="ctr" defTabSz="914400" rtl="0" eaLnBrk="1" fontAlgn="auto" latinLnBrk="0" hangingPunct="1">
@@ -11025,137 +11443,12 @@
           </a:p>
         </p:txBody>
       </p:sp>
-      <p:pic>
-        <p:nvPicPr>
-          <p:cNvPr id="2050" name="Picture 2" descr="SpongeBob PNG">
-            <a:extLst>
-              <a:ext uri="{FF2B5EF4-FFF2-40B4-BE49-F238E27FC236}">
-                <a16:creationId xmlns:a16="http://schemas.microsoft.com/office/drawing/2014/main" id="{5D7D6972-40A6-4A33-87B8-76CC953DA546}"/>
-              </a:ext>
-            </a:extLst>
-          </p:cNvPr>
-          <p:cNvPicPr>
-            <a:picLocks noChangeAspect="1" noChangeArrowheads="1"/>
-          </p:cNvPicPr>
-          <p:nvPr/>
-        </p:nvPicPr>
-        <p:blipFill rotWithShape="1">
-          <a:blip r:embed="rId4">
-            <a:extLst>
-              <a:ext uri="{28A0092B-C50C-407E-A947-70E740481C1C}">
-                <a14:useLocalDpi xmlns:a14="http://schemas.microsoft.com/office/drawing/2010/main" val="0"/>
-              </a:ext>
-            </a:extLst>
-          </a:blip>
-          <a:srcRect r="-1" b="17145"/>
-          <a:stretch/>
-        </p:blipFill>
-        <p:spPr bwMode="auto">
-          <a:xfrm>
-            <a:off x="6893344" y="760562"/>
-            <a:ext cx="5298683" cy="6097438"/>
-          </a:xfrm>
-          <a:custGeom>
-            <a:avLst/>
-            <a:gdLst/>
-            <a:ahLst/>
-            <a:cxnLst/>
-            <a:rect l="l" t="t" r="r" b="b"/>
-            <a:pathLst>
-              <a:path w="5298683" h="6097438">
-                <a:moveTo>
-                  <a:pt x="3120528" y="0"/>
-                </a:moveTo>
-                <a:cubicBezTo>
-                  <a:pt x="3874524" y="0"/>
-                  <a:pt x="4566062" y="267415"/>
-                  <a:pt x="5105473" y="712577"/>
-                </a:cubicBezTo>
-                <a:lnTo>
-                  <a:pt x="5298683" y="888178"/>
-                </a:lnTo>
-                <a:lnTo>
-                  <a:pt x="5298683" y="5352876"/>
-                </a:lnTo>
-                <a:lnTo>
-                  <a:pt x="5105473" y="5528477"/>
-                </a:lnTo>
-                <a:cubicBezTo>
-                  <a:pt x="4874296" y="5719261"/>
-                  <a:pt x="4615179" y="5877397"/>
-                  <a:pt x="4335177" y="5995828"/>
-                </a:cubicBezTo>
-                <a:lnTo>
-                  <a:pt x="4057556" y="6097438"/>
-                </a:lnTo>
-                <a:lnTo>
-                  <a:pt x="2183499" y="6097438"/>
-                </a:lnTo>
-                <a:lnTo>
-                  <a:pt x="1905878" y="5995828"/>
-                </a:lnTo>
-                <a:cubicBezTo>
-                  <a:pt x="785873" y="5522106"/>
-                  <a:pt x="0" y="4413092"/>
-                  <a:pt x="0" y="3120527"/>
-                </a:cubicBezTo>
-                <a:cubicBezTo>
-                  <a:pt x="0" y="1397108"/>
-                  <a:pt x="1397108" y="0"/>
-                  <a:pt x="3120528" y="0"/>
-                </a:cubicBezTo>
-                <a:close/>
-              </a:path>
-            </a:pathLst>
-          </a:custGeom>
-          <a:noFill/>
-          <a:extLst>
-            <a:ext uri="{909E8E84-426E-40DD-AFC4-6F175D3DCCD1}">
-              <a14:hiddenFill xmlns:a14="http://schemas.microsoft.com/office/drawing/2010/main">
-                <a:solidFill>
-                  <a:srgbClr val="FFFFFF"/>
-                </a:solidFill>
-              </a14:hiddenFill>
-            </a:ext>
-          </a:extLst>
-        </p:spPr>
-      </p:pic>
-    </p:spTree>
-    <p:extLst>
-      <p:ext uri="{BB962C8B-B14F-4D97-AF65-F5344CB8AC3E}">
-        <p14:creationId xmlns:p14="http://schemas.microsoft.com/office/powerpoint/2010/main" val="3268188756"/>
-      </p:ext>
-    </p:extLst>
-  </p:cSld>
-  <p:clrMapOvr>
-    <a:overrideClrMapping bg1="dk1" tx1="lt1" bg2="dk2" tx2="lt2" accent1="accent1" accent2="accent2" accent3="accent3" accent4="accent4" accent5="accent5" accent6="accent6" hlink="hlink" folHlink="folHlink"/>
-  </p:clrMapOvr>
-</p:sld>
-</file>
-
-<file path=ppt/slides/slide4.xml><?xml version="1.0" encoding="utf-8"?>
-<p:sld xmlns:a="http://schemas.openxmlformats.org/drawingml/2006/main" xmlns:r="http://schemas.openxmlformats.org/officeDocument/2006/relationships" xmlns:p="http://schemas.openxmlformats.org/presentationml/2006/main">
-  <p:cSld>
-    <p:spTree>
-      <p:nvGrpSpPr>
-        <p:cNvPr id="1" name=""/>
-        <p:cNvGrpSpPr/>
-        <p:nvPr/>
-      </p:nvGrpSpPr>
-      <p:grpSpPr>
-        <a:xfrm>
-          <a:off x="0" y="0"/>
-          <a:ext cx="0" cy="0"/>
-          <a:chOff x="0" y="0"/>
-          <a:chExt cx="0" cy="0"/>
-        </a:xfrm>
-      </p:grpSpPr>
       <p:sp>
         <p:nvSpPr>
           <p:cNvPr id="2" name="Title 1">
             <a:extLst>
               <a:ext uri="{FF2B5EF4-FFF2-40B4-BE49-F238E27FC236}">
-                <a16:creationId xmlns:a16="http://schemas.microsoft.com/office/drawing/2014/main" id="{305C6CA3-E250-4BBC-8BF4-0DCC9DFF068C}"/>
+                <a16:creationId xmlns:a16="http://schemas.microsoft.com/office/drawing/2014/main" id="{F567C8BB-46F9-4DDD-8CCE-95C7348F45B1}"/>
               </a:ext>
             </a:extLst>
           </p:cNvPr>
@@ -11166,114 +11459,31 @@
             <p:ph type="title"/>
           </p:nvPr>
         </p:nvSpPr>
-        <p:spPr/>
+        <p:spPr>
+          <a:xfrm>
+            <a:off x="1051560" y="586822"/>
+            <a:ext cx="3657600" cy="1645920"/>
+          </a:xfrm>
+        </p:spPr>
         <p:txBody>
-          <a:bodyPr/>
+          <a:bodyPr>
+            <a:normAutofit/>
+          </a:bodyPr>
           <a:lstStyle/>
           <a:p>
             <a:r>
-              <a:rPr lang="en-US" dirty="0"/>
-              <a:t>Onboarding</a:t>
+              <a:rPr lang="en-US" sz="3200"/>
+              <a:t>Containers vs VMs</a:t>
             </a:r>
           </a:p>
         </p:txBody>
       </p:sp>
-      <p:pic>
-        <p:nvPicPr>
-          <p:cNvPr id="2050" name="Picture 2">
+      <p:sp>
+        <p:nvSpPr>
+          <p:cNvPr id="77" name="Rectangle 76">
             <a:extLst>
               <a:ext uri="{FF2B5EF4-FFF2-40B4-BE49-F238E27FC236}">
-                <a16:creationId xmlns:a16="http://schemas.microsoft.com/office/drawing/2014/main" id="{5A25CC38-514A-48C5-BD35-4B973B98107F}"/>
-              </a:ext>
-            </a:extLst>
-          </p:cNvPr>
-          <p:cNvPicPr>
-            <a:picLocks noGrp="1" noChangeAspect="1" noChangeArrowheads="1"/>
-          </p:cNvPicPr>
-          <p:nvPr>
-            <p:ph idx="1"/>
-          </p:nvPr>
-        </p:nvPicPr>
-        <p:blipFill>
-          <a:blip r:embed="rId2">
-            <a:extLst>
-              <a:ext uri="{28A0092B-C50C-407E-A947-70E740481C1C}">
-                <a14:useLocalDpi xmlns:a14="http://schemas.microsoft.com/office/drawing/2010/main" val="0"/>
-              </a:ext>
-            </a:extLst>
-          </a:blip>
-          <a:srcRect/>
-          <a:stretch>
-            <a:fillRect/>
-          </a:stretch>
-        </p:blipFill>
-        <p:spPr bwMode="auto">
-          <a:xfrm>
-            <a:off x="3559962" y="943082"/>
-            <a:ext cx="5333333" cy="3000000"/>
-          </a:xfrm>
-          <a:prstGeom prst="rect">
-            <a:avLst/>
-          </a:prstGeom>
-          <a:noFill/>
-          <a:extLst>
-            <a:ext uri="{909E8E84-426E-40DD-AFC4-6F175D3DCCD1}">
-              <a14:hiddenFill xmlns:a14="http://schemas.microsoft.com/office/drawing/2010/main">
-                <a:solidFill>
-                  <a:srgbClr val="FFFFFF"/>
-                </a:solidFill>
-              </a14:hiddenFill>
-            </a:ext>
-          </a:extLst>
-        </p:spPr>
-      </p:pic>
-    </p:spTree>
-    <p:extLst>
-      <p:ext uri="{BB962C8B-B14F-4D97-AF65-F5344CB8AC3E}">
-        <p14:creationId xmlns:p14="http://schemas.microsoft.com/office/powerpoint/2010/main" val="3542720554"/>
-      </p:ext>
-    </p:extLst>
-  </p:cSld>
-  <p:clrMapOvr>
-    <a:masterClrMapping/>
-  </p:clrMapOvr>
-</p:sld>
-</file>
-
-<file path=ppt/slides/slide5.xml><?xml version="1.0" encoding="utf-8"?>
-<p:sld xmlns:a="http://schemas.openxmlformats.org/drawingml/2006/main" xmlns:r="http://schemas.openxmlformats.org/officeDocument/2006/relationships" xmlns:p="http://schemas.openxmlformats.org/presentationml/2006/main">
-  <p:cSld>
-    <p:bg>
-      <p:bgPr>
-        <a:solidFill>
-          <a:schemeClr val="bg1">
-            <a:tint val="95000"/>
-            <a:satMod val="170000"/>
-          </a:schemeClr>
-        </a:solidFill>
-        <a:effectLst/>
-      </p:bgPr>
-    </p:bg>
-    <p:spTree>
-      <p:nvGrpSpPr>
-        <p:cNvPr id="1" name=""/>
-        <p:cNvGrpSpPr/>
-        <p:nvPr/>
-      </p:nvGrpSpPr>
-      <p:grpSpPr>
-        <a:xfrm>
-          <a:off x="0" y="0"/>
-          <a:ext cx="0" cy="0"/>
-          <a:chOff x="0" y="0"/>
-          <a:chExt cx="0" cy="0"/>
-        </a:xfrm>
-      </p:grpSpPr>
-      <p:sp>
-        <p:nvSpPr>
-          <p:cNvPr id="10" name="Rectangle 9">
-            <a:extLst>
-              <a:ext uri="{FF2B5EF4-FFF2-40B4-BE49-F238E27FC236}">
-                <a16:creationId xmlns:a16="http://schemas.microsoft.com/office/drawing/2014/main" id="{EE1FC7B4-E4A7-4452-B413-1A623E3A7230}"/>
+                <a16:creationId xmlns:a16="http://schemas.microsoft.com/office/drawing/2014/main" id="{C1A2385B-1D2A-4E17-84FA-6CB7F0AAE473}"/>
               </a:ext>
               <a:ext uri="{C183D7F6-B498-43B3-948B-1728B52AA6E4}">
                 <adec:decorative xmlns:adec="http://schemas.microsoft.com/office/drawing/2017/decorative" val="1"/>
@@ -11293,16 +11503,14 @@
         </p:nvSpPr>
         <p:spPr>
           <a:xfrm>
-            <a:off x="0" y="-3324"/>
-            <a:ext cx="12192000" cy="6861324"/>
+            <a:off x="490408" y="1057739"/>
+            <a:ext cx="128016" cy="704088"/>
           </a:xfrm>
           <a:prstGeom prst="rect">
             <a:avLst/>
           </a:prstGeom>
           <a:solidFill>
-            <a:schemeClr val="bg1">
-              <a:alpha val="9000"/>
-            </a:schemeClr>
+            <a:schemeClr val="accent2"/>
           </a:solidFill>
           <a:ln>
             <a:noFill/>
@@ -11329,16 +11537,21 @@
           <a:lstStyle/>
           <a:p>
             <a:pPr algn="ctr"/>
-            <a:endParaRPr lang="en-US"/>
+            <a:endParaRPr lang="en-US" dirty="0">
+              <a:solidFill>
+                <a:prstClr val="white"/>
+              </a:solidFill>
+              <a:latin typeface="Calibri" panose="020F0502020204030204"/>
+            </a:endParaRPr>
           </a:p>
         </p:txBody>
       </p:sp>
       <p:sp>
         <p:nvSpPr>
-          <p:cNvPr id="12" name="Freeform 13">
+          <p:cNvPr id="79" name="Rectangle 78">
             <a:extLst>
               <a:ext uri="{FF2B5EF4-FFF2-40B4-BE49-F238E27FC236}">
-                <a16:creationId xmlns:a16="http://schemas.microsoft.com/office/drawing/2014/main" id="{E0709AF0-24F0-4486-B189-BE6386BDB198}"/>
+                <a16:creationId xmlns:a16="http://schemas.microsoft.com/office/drawing/2014/main" id="{5E791F2F-79DB-4CC0-9FA1-001E3E91E8B7}"/>
               </a:ext>
               <a:ext uri="{C183D7F6-B498-43B3-948B-1728B52AA6E4}">
                 <adec:decorative xmlns:adec="http://schemas.microsoft.com/office/drawing/2017/decorative" val="1"/>
@@ -11357,64 +11570,20 @@
           </p:nvPr>
         </p:nvSpPr>
         <p:spPr>
-          <a:xfrm>
-            <a:off x="0" y="0"/>
-            <a:ext cx="11786754" cy="6858000"/>
+          <a:xfrm rot="5400000">
+            <a:off x="4243541" y="1400638"/>
+            <a:ext cx="1463040" cy="18288"/>
           </a:xfrm>
-          <a:custGeom>
+          <a:prstGeom prst="rect">
             <a:avLst/>
-            <a:gdLst>
-              <a:gd name="connsiteX0" fmla="*/ 0 w 11786754"/>
-              <a:gd name="connsiteY0" fmla="*/ 0 h 6858000"/>
-              <a:gd name="connsiteX1" fmla="*/ 8610600 w 11786754"/>
-              <a:gd name="connsiteY1" fmla="*/ 0 h 6858000"/>
-              <a:gd name="connsiteX2" fmla="*/ 11786754 w 11786754"/>
-              <a:gd name="connsiteY2" fmla="*/ 6858000 h 6858000"/>
-              <a:gd name="connsiteX3" fmla="*/ 0 w 11786754"/>
-              <a:gd name="connsiteY3" fmla="*/ 6858000 h 6858000"/>
-            </a:gdLst>
-            <a:ahLst/>
-            <a:cxnLst>
-              <a:cxn ang="0">
-                <a:pos x="connsiteX0" y="connsiteY0"/>
-              </a:cxn>
-              <a:cxn ang="0">
-                <a:pos x="connsiteX1" y="connsiteY1"/>
-              </a:cxn>
-              <a:cxn ang="0">
-                <a:pos x="connsiteX2" y="connsiteY2"/>
-              </a:cxn>
-              <a:cxn ang="0">
-                <a:pos x="connsiteX3" y="connsiteY3"/>
-              </a:cxn>
-            </a:cxnLst>
-            <a:rect l="l" t="t" r="r" b="b"/>
-            <a:pathLst>
-              <a:path w="11786754" h="6858000">
-                <a:moveTo>
-                  <a:pt x="0" y="0"/>
-                </a:moveTo>
-                <a:lnTo>
-                  <a:pt x="8610600" y="0"/>
-                </a:lnTo>
-                <a:lnTo>
-                  <a:pt x="11786754" y="6858000"/>
-                </a:lnTo>
-                <a:lnTo>
-                  <a:pt x="0" y="6858000"/>
-                </a:lnTo>
-                <a:close/>
-              </a:path>
-            </a:pathLst>
-          </a:custGeom>
+          </a:prstGeom>
           <a:solidFill>
-            <a:schemeClr val="bg1">
-              <a:alpha val="30000"/>
-            </a:schemeClr>
+            <a:srgbClr val="D5D5D5"/>
           </a:solidFill>
-          <a:ln>
+          <a:ln w="3175">
             <a:noFill/>
           </a:ln>
+          <a:effectLst/>
         </p:spPr>
         <p:style>
           <a:lnRef idx="2">
@@ -11436,154 +11605,37 @@
           <a:bodyPr rtlCol="0" anchor="ctr"/>
           <a:lstStyle/>
           <a:p>
-            <a:pPr algn="ctr"/>
-            <a:endParaRPr lang="en-US"/>
-          </a:p>
-        </p:txBody>
-      </p:sp>
-      <p:sp>
-        <p:nvSpPr>
-          <p:cNvPr id="23" name="Freeform 11">
-            <a:extLst>
-              <a:ext uri="{FF2B5EF4-FFF2-40B4-BE49-F238E27FC236}">
-                <a16:creationId xmlns:a16="http://schemas.microsoft.com/office/drawing/2014/main" id="{FBE3B62F-5853-4A3C-B050-6186351A7176}"/>
-              </a:ext>
-              <a:ext uri="{C183D7F6-B498-43B3-948B-1728B52AA6E4}">
-                <adec:decorative xmlns:adec="http://schemas.microsoft.com/office/drawing/2017/decorative" val="1"/>
-              </a:ext>
-            </a:extLst>
-          </p:cNvPr>
-          <p:cNvSpPr>
-            <a:spLocks noGrp="1" noRot="1" noChangeAspect="1" noMove="1" noResize="1" noEditPoints="1" noAdjustHandles="1" noChangeArrowheads="1" noChangeShapeType="1" noTextEdit="1"/>
-          </p:cNvSpPr>
-          <p:nvPr>
-            <p:extLst>
-              <p:ext uri="{386F3935-93C4-4BCD-93E2-E3B085C9AB24}">
-                <p16:designElem xmlns:p16="http://schemas.microsoft.com/office/powerpoint/2015/main" val="1"/>
-              </p:ext>
-            </p:extLst>
-          </p:nvPr>
-        </p:nvSpPr>
-        <p:spPr>
-          <a:xfrm>
-            <a:off x="0" y="0"/>
-            <a:ext cx="3581400" cy="6858000"/>
-          </a:xfrm>
-          <a:custGeom>
-            <a:avLst/>
-            <a:gdLst>
-              <a:gd name="connsiteX0" fmla="*/ 0 w 3581400"/>
-              <a:gd name="connsiteY0" fmla="*/ 0 h 6858000"/>
-              <a:gd name="connsiteX1" fmla="*/ 405246 w 3581400"/>
-              <a:gd name="connsiteY1" fmla="*/ 0 h 6858000"/>
-              <a:gd name="connsiteX2" fmla="*/ 3581400 w 3581400"/>
-              <a:gd name="connsiteY2" fmla="*/ 6858000 h 6858000"/>
-              <a:gd name="connsiteX3" fmla="*/ 0 w 3581400"/>
-              <a:gd name="connsiteY3" fmla="*/ 6858000 h 6858000"/>
-            </a:gdLst>
-            <a:ahLst/>
-            <a:cxnLst>
-              <a:cxn ang="0">
-                <a:pos x="connsiteX0" y="connsiteY0"/>
-              </a:cxn>
-              <a:cxn ang="0">
-                <a:pos x="connsiteX1" y="connsiteY1"/>
-              </a:cxn>
-              <a:cxn ang="0">
-                <a:pos x="connsiteX2" y="connsiteY2"/>
-              </a:cxn>
-              <a:cxn ang="0">
-                <a:pos x="connsiteX3" y="connsiteY3"/>
-              </a:cxn>
-            </a:cxnLst>
-            <a:rect l="l" t="t" r="r" b="b"/>
-            <a:pathLst>
-              <a:path w="3581400" h="6858000">
-                <a:moveTo>
-                  <a:pt x="0" y="0"/>
-                </a:moveTo>
-                <a:lnTo>
-                  <a:pt x="405246" y="0"/>
-                </a:lnTo>
-                <a:lnTo>
-                  <a:pt x="3581400" y="6858000"/>
-                </a:lnTo>
-                <a:lnTo>
-                  <a:pt x="0" y="6858000"/>
-                </a:lnTo>
-                <a:close/>
-              </a:path>
-            </a:pathLst>
-          </a:custGeom>
-          <a:solidFill>
-            <a:schemeClr val="bg1">
-              <a:alpha val="30000"/>
-            </a:schemeClr>
-          </a:solidFill>
-          <a:ln>
-            <a:noFill/>
-          </a:ln>
-        </p:spPr>
-        <p:style>
-          <a:lnRef idx="2">
-            <a:schemeClr val="accent1">
-              <a:shade val="50000"/>
-            </a:schemeClr>
-          </a:lnRef>
-          <a:fillRef idx="1">
-            <a:schemeClr val="accent1"/>
-          </a:fillRef>
-          <a:effectRef idx="0">
-            <a:schemeClr val="accent1"/>
-          </a:effectRef>
-          <a:fontRef idx="minor">
-            <a:schemeClr val="lt1"/>
-          </a:fontRef>
-        </p:style>
-        <p:txBody>
-          <a:bodyPr wrap="square" rtlCol="0" anchor="ctr">
-            <a:noAutofit/>
-          </a:bodyPr>
-          <a:lstStyle/>
-          <a:p>
-            <a:pPr algn="ctr"/>
-            <a:endParaRPr lang="en-US"/>
-          </a:p>
-        </p:txBody>
-      </p:sp>
-      <p:sp>
-        <p:nvSpPr>
-          <p:cNvPr id="2" name="Title 1">
-            <a:extLst>
-              <a:ext uri="{FF2B5EF4-FFF2-40B4-BE49-F238E27FC236}">
-                <a16:creationId xmlns:a16="http://schemas.microsoft.com/office/drawing/2014/main" id="{778DCF44-C8A7-4068-9FD8-2796E6FC063F}"/>
-              </a:ext>
-            </a:extLst>
-          </p:cNvPr>
-          <p:cNvSpPr>
-            <a:spLocks noGrp="1"/>
-          </p:cNvSpPr>
-          <p:nvPr>
-            <p:ph type="title"/>
-          </p:nvPr>
-        </p:nvSpPr>
-        <p:spPr>
-          <a:xfrm>
-            <a:off x="833002" y="448253"/>
-            <a:ext cx="10520702" cy="1325563"/>
-          </a:xfrm>
-        </p:spPr>
-        <p:txBody>
-          <a:bodyPr>
-            <a:normAutofit/>
-          </a:bodyPr>
-          <a:lstStyle/>
-          <a:p>
-            <a:r>
-              <a:rPr lang="en-US"/>
-              <a:t>What is Docker?</a:t>
-            </a:r>
-            <a:endParaRPr lang="en-US" dirty="0"/>
+            <a:pPr marL="0" marR="0" lvl="0" indent="0" algn="ctr" defTabSz="914400" rtl="0" eaLnBrk="1" fontAlgn="auto" latinLnBrk="0" hangingPunct="1">
+              <a:lnSpc>
+                <a:spcPct val="100000"/>
+              </a:lnSpc>
+              <a:spcBef>
+                <a:spcPts val="0"/>
+              </a:spcBef>
+              <a:spcAft>
+                <a:spcPts val="0"/>
+              </a:spcAft>
+              <a:buClrTx/>
+              <a:buSzTx/>
+              <a:buFontTx/>
+              <a:buNone/>
+              <a:tabLst/>
+              <a:defRPr/>
+            </a:pPr>
+            <a:endParaRPr kumimoji="0" lang="en-US" sz="1800" b="0" i="0" u="none" strike="noStrike" kern="1200" cap="none" spc="0" normalizeH="0" baseline="0" noProof="0">
+              <a:ln>
+                <a:noFill/>
+              </a:ln>
+              <a:solidFill>
+                <a:prstClr val="white"/>
+              </a:solidFill>
+              <a:effectLst/>
+              <a:uLnTx/>
+              <a:uFillTx/>
+              <a:latin typeface="Calibri" panose="020F0502020204030204"/>
+              <a:ea typeface="+mn-ea"/>
+              <a:cs typeface="+mn-cs"/>
+            </a:endParaRPr>
           </a:p>
         </p:txBody>
       </p:sp>
@@ -11592,7 +11644,7 @@
           <p:cNvPr id="3" name="Content Placeholder 2">
             <a:extLst>
               <a:ext uri="{FF2B5EF4-FFF2-40B4-BE49-F238E27FC236}">
-                <a16:creationId xmlns:a16="http://schemas.microsoft.com/office/drawing/2014/main" id="{E3A3DA7C-992D-4B8A-9EF3-5B86D09E5393}"/>
+                <a16:creationId xmlns:a16="http://schemas.microsoft.com/office/drawing/2014/main" id="{DC417324-7EF0-493E-A7FA-837E56A4C60E}"/>
               </a:ext>
             </a:extLst>
           </p:cNvPr>
@@ -11605,31 +11657,86 @@
         </p:nvSpPr>
         <p:spPr>
           <a:xfrm>
-            <a:off x="838200" y="2191807"/>
-            <a:ext cx="4936067" cy="3985155"/>
+            <a:off x="5250106" y="586822"/>
+            <a:ext cx="6106742" cy="1645920"/>
           </a:xfrm>
         </p:spPr>
         <p:txBody>
-          <a:bodyPr>
+          <a:bodyPr anchor="ctr">
             <a:normAutofit/>
           </a:bodyPr>
           <a:lstStyle/>
           <a:p>
-            <a:endParaRPr lang="en-US" sz="2000" dirty="0"/>
+            <a:r>
+              <a:rPr lang="en-US" sz="1800" dirty="0"/>
+              <a:t>Docker Containers are an abstraction at the app layer whereas Virtual Machines are an abstraction of physical hardware turning one machine into many.</a:t>
+            </a:r>
+          </a:p>
+          <a:p>
+            <a:r>
+              <a:rPr lang="en-US" sz="1800" dirty="0"/>
+              <a:t>Docker containers take up less space then VMs by sharing an OS whereas VMs include a full copy of an OS.</a:t>
+            </a:r>
           </a:p>
         </p:txBody>
       </p:sp>
       <p:pic>
         <p:nvPicPr>
-          <p:cNvPr id="5" name="Picture 4" descr="Logo&#10;&#10;Description automatically generated">
+          <p:cNvPr id="2050" name="Picture 2">
             <a:extLst>
               <a:ext uri="{FF2B5EF4-FFF2-40B4-BE49-F238E27FC236}">
-                <a16:creationId xmlns:a16="http://schemas.microsoft.com/office/drawing/2014/main" id="{0476BB02-BBC0-49A9-A8A7-108D804A141C}"/>
+                <a16:creationId xmlns:a16="http://schemas.microsoft.com/office/drawing/2014/main" id="{F115E85E-1F5C-407F-AAED-7EBF35F1CDBE}"/>
               </a:ext>
             </a:extLst>
           </p:cNvPr>
           <p:cNvPicPr>
-            <a:picLocks noChangeAspect="1"/>
+            <a:picLocks noChangeAspect="1" noChangeArrowheads="1"/>
+          </p:cNvPicPr>
+          <p:nvPr/>
+        </p:nvPicPr>
+        <p:blipFill>
+          <a:blip r:embed="rId2">
+            <a:extLst>
+              <a:ext uri="{28A0092B-C50C-407E-A947-70E740481C1C}">
+                <a14:useLocalDpi xmlns:a14="http://schemas.microsoft.com/office/drawing/2010/main" val="0"/>
+              </a:ext>
+            </a:extLst>
+          </a:blip>
+          <a:stretch>
+            <a:fillRect/>
+          </a:stretch>
+        </p:blipFill>
+        <p:spPr bwMode="auto">
+          <a:xfrm>
+            <a:off x="1121122" y="2729397"/>
+            <a:ext cx="4354830" cy="3483864"/>
+          </a:xfrm>
+          <a:prstGeom prst="rect">
+            <a:avLst/>
+          </a:prstGeom>
+          <a:noFill/>
+          <a:extLst>
+            <a:ext uri="{909E8E84-426E-40DD-AFC4-6F175D3DCCD1}">
+              <a14:hiddenFill xmlns:a14="http://schemas.microsoft.com/office/drawing/2010/main">
+                <a:solidFill>
+                  <a:srgbClr val="FFFFFF"/>
+                </a:solidFill>
+              </a14:hiddenFill>
+            </a:ext>
+          </a:extLst>
+        </p:spPr>
+      </p:pic>
+      <p:pic>
+        <p:nvPicPr>
+          <p:cNvPr id="2052" name="Picture 4">
+            <a:extLst>
+              <a:ext uri="{FF2B5EF4-FFF2-40B4-BE49-F238E27FC236}">
+                <a16:creationId xmlns:a16="http://schemas.microsoft.com/office/drawing/2014/main" id="{921EB43F-7E90-4B16-AA82-07D71E7DE190}"/>
+              </a:ext>
+            </a:extLst>
+          </p:cNvPr>
+          <p:cNvPicPr>
+            <a:picLocks noChangeAspect="1" noChangeArrowheads="1"/>
           </p:cNvPicPr>
           <p:nvPr/>
         </p:nvPicPr>
@@ -11645,186 +11752,30 @@
             <a:fillRect/>
           </a:stretch>
         </p:blipFill>
-        <p:spPr>
+        <p:spPr bwMode="auto">
           <a:xfrm>
-            <a:off x="6552945" y="2191807"/>
-            <a:ext cx="4665548" cy="3985156"/>
+            <a:off x="6782907" y="2729397"/>
+            <a:ext cx="4354830" cy="3483864"/>
           </a:xfrm>
           <a:prstGeom prst="rect">
             <a:avLst/>
           </a:prstGeom>
+          <a:noFill/>
+          <a:extLst>
+            <a:ext uri="{909E8E84-426E-40DD-AFC4-6F175D3DCCD1}">
+              <a14:hiddenFill xmlns:a14="http://schemas.microsoft.com/office/drawing/2010/main">
+                <a:solidFill>
+                  <a:srgbClr val="FFFFFF"/>
+                </a:solidFill>
+              </a14:hiddenFill>
+            </a:ext>
+          </a:extLst>
         </p:spPr>
       </p:pic>
     </p:spTree>
     <p:extLst>
       <p:ext uri="{BB962C8B-B14F-4D97-AF65-F5344CB8AC3E}">
-        <p14:creationId xmlns:p14="http://schemas.microsoft.com/office/powerpoint/2010/main" val="1187821424"/>
-      </p:ext>
-    </p:extLst>
-  </p:cSld>
-  <p:clrMapOvr>
-    <a:overrideClrMapping bg1="dk1" tx1="lt1" bg2="dk2" tx2="lt2" accent1="accent1" accent2="accent2" accent3="accent3" accent4="accent4" accent5="accent5" accent6="accent6" hlink="hlink" folHlink="folHlink"/>
-  </p:clrMapOvr>
-</p:sld>
-</file>
-
-<file path=ppt/slides/slide6.xml><?xml version="1.0" encoding="utf-8"?>
-<p:sld xmlns:a="http://schemas.openxmlformats.org/drawingml/2006/main" xmlns:r="http://schemas.openxmlformats.org/officeDocument/2006/relationships" xmlns:p="http://schemas.openxmlformats.org/presentationml/2006/main">
-  <p:cSld>
-    <p:spTree>
-      <p:nvGrpSpPr>
-        <p:cNvPr id="1" name=""/>
-        <p:cNvGrpSpPr/>
-        <p:nvPr/>
-      </p:nvGrpSpPr>
-      <p:grpSpPr>
-        <a:xfrm>
-          <a:off x="0" y="0"/>
-          <a:ext cx="0" cy="0"/>
-          <a:chOff x="0" y="0"/>
-          <a:chExt cx="0" cy="0"/>
-        </a:xfrm>
-      </p:grpSpPr>
-      <p:sp>
-        <p:nvSpPr>
-          <p:cNvPr id="2" name="Title 1">
-            <a:extLst>
-              <a:ext uri="{FF2B5EF4-FFF2-40B4-BE49-F238E27FC236}">
-                <a16:creationId xmlns:a16="http://schemas.microsoft.com/office/drawing/2014/main" id="{8B593912-1BFE-484F-9604-051567C04C7A}"/>
-              </a:ext>
-            </a:extLst>
-          </p:cNvPr>
-          <p:cNvSpPr>
-            <a:spLocks noGrp="1"/>
-          </p:cNvSpPr>
-          <p:nvPr>
-            <p:ph type="title"/>
-          </p:nvPr>
-        </p:nvSpPr>
-        <p:spPr/>
-        <p:txBody>
-          <a:bodyPr/>
-          <a:lstStyle/>
-          <a:p>
-            <a:r>
-              <a:rPr lang="en-US" dirty="0"/>
-              <a:t>What are Containers?</a:t>
-            </a:r>
-          </a:p>
-        </p:txBody>
-      </p:sp>
-      <p:sp>
-        <p:nvSpPr>
-          <p:cNvPr id="3" name="Content Placeholder 2">
-            <a:extLst>
-              <a:ext uri="{FF2B5EF4-FFF2-40B4-BE49-F238E27FC236}">
-                <a16:creationId xmlns:a16="http://schemas.microsoft.com/office/drawing/2014/main" id="{E94F87D4-BC58-4E58-80B4-82EA0050DB21}"/>
-              </a:ext>
-            </a:extLst>
-          </p:cNvPr>
-          <p:cNvSpPr>
-            <a:spLocks noGrp="1"/>
-          </p:cNvSpPr>
-          <p:nvPr>
-            <p:ph idx="1"/>
-          </p:nvPr>
-        </p:nvSpPr>
-        <p:spPr/>
-        <p:txBody>
-          <a:bodyPr/>
-          <a:lstStyle/>
-          <a:p>
-            <a:endParaRPr lang="en-US" dirty="0"/>
-          </a:p>
-        </p:txBody>
-      </p:sp>
-    </p:spTree>
-    <p:extLst>
-      <p:ext uri="{BB962C8B-B14F-4D97-AF65-F5344CB8AC3E}">
-        <p14:creationId xmlns:p14="http://schemas.microsoft.com/office/powerpoint/2010/main" val="4286135504"/>
-      </p:ext>
-    </p:extLst>
-  </p:cSld>
-  <p:clrMapOvr>
-    <a:masterClrMapping/>
-  </p:clrMapOvr>
-</p:sld>
-</file>
-
-<file path=ppt/slides/slide7.xml><?xml version="1.0" encoding="utf-8"?>
-<p:sld xmlns:a="http://schemas.openxmlformats.org/drawingml/2006/main" xmlns:r="http://schemas.openxmlformats.org/officeDocument/2006/relationships" xmlns:p="http://schemas.openxmlformats.org/presentationml/2006/main">
-  <p:cSld>
-    <p:spTree>
-      <p:nvGrpSpPr>
-        <p:cNvPr id="1" name=""/>
-        <p:cNvGrpSpPr/>
-        <p:nvPr/>
-      </p:nvGrpSpPr>
-      <p:grpSpPr>
-        <a:xfrm>
-          <a:off x="0" y="0"/>
-          <a:ext cx="0" cy="0"/>
-          <a:chOff x="0" y="0"/>
-          <a:chExt cx="0" cy="0"/>
-        </a:xfrm>
-      </p:grpSpPr>
-      <p:sp>
-        <p:nvSpPr>
-          <p:cNvPr id="2" name="Title 1">
-            <a:extLst>
-              <a:ext uri="{FF2B5EF4-FFF2-40B4-BE49-F238E27FC236}">
-                <a16:creationId xmlns:a16="http://schemas.microsoft.com/office/drawing/2014/main" id="{66E1D352-27D6-4C88-AD83-14EDD14C27AE}"/>
-              </a:ext>
-            </a:extLst>
-          </p:cNvPr>
-          <p:cNvSpPr>
-            <a:spLocks noGrp="1"/>
-          </p:cNvSpPr>
-          <p:nvPr>
-            <p:ph type="title"/>
-          </p:nvPr>
-        </p:nvSpPr>
-        <p:spPr/>
-        <p:txBody>
-          <a:bodyPr/>
-          <a:lstStyle/>
-          <a:p>
-            <a:r>
-              <a:rPr lang="en-US" dirty="0"/>
-              <a:t>Vocabulary</a:t>
-            </a:r>
-          </a:p>
-        </p:txBody>
-      </p:sp>
-      <p:sp>
-        <p:nvSpPr>
-          <p:cNvPr id="3" name="Content Placeholder 2">
-            <a:extLst>
-              <a:ext uri="{FF2B5EF4-FFF2-40B4-BE49-F238E27FC236}">
-                <a16:creationId xmlns:a16="http://schemas.microsoft.com/office/drawing/2014/main" id="{AC5699FD-9A02-4BAD-B338-B5073A7C0082}"/>
-              </a:ext>
-            </a:extLst>
-          </p:cNvPr>
-          <p:cNvSpPr>
-            <a:spLocks noGrp="1"/>
-          </p:cNvSpPr>
-          <p:nvPr>
-            <p:ph idx="1"/>
-          </p:nvPr>
-        </p:nvSpPr>
-        <p:spPr/>
-        <p:txBody>
-          <a:bodyPr/>
-          <a:lstStyle/>
-          <a:p>
-            <a:endParaRPr lang="en-US" dirty="0"/>
-          </a:p>
-        </p:txBody>
-      </p:sp>
-    </p:spTree>
-    <p:extLst>
-      <p:ext uri="{BB962C8B-B14F-4D97-AF65-F5344CB8AC3E}">
-        <p14:creationId xmlns:p14="http://schemas.microsoft.com/office/powerpoint/2010/main" val="4100264673"/>
+        <p14:creationId xmlns:p14="http://schemas.microsoft.com/office/powerpoint/2010/main" val="998637980"/>
       </p:ext>
     </p:extLst>
   </p:cSld>
@@ -11856,7 +11807,7 @@
           <p:cNvPr id="2" name="Title 1">
             <a:extLst>
               <a:ext uri="{FF2B5EF4-FFF2-40B4-BE49-F238E27FC236}">
-                <a16:creationId xmlns:a16="http://schemas.microsoft.com/office/drawing/2014/main" id="{AB391E3D-AD4C-4D61-BF52-3A615B6C640D}"/>
+                <a16:creationId xmlns:a16="http://schemas.microsoft.com/office/drawing/2014/main" id="{D82BB61C-FE40-4EF7-BD9C-005A4B1C4FA9}"/>
               </a:ext>
             </a:extLst>
           </p:cNvPr>
@@ -11874,7 +11825,7 @@
           <a:p>
             <a:r>
               <a:rPr lang="en-US" dirty="0"/>
-              <a:t>Commands</a:t>
+              <a:t>File Structure</a:t>
             </a:r>
           </a:p>
         </p:txBody>
@@ -11884,7 +11835,7 @@
           <p:cNvPr id="3" name="Content Placeholder 2">
             <a:extLst>
               <a:ext uri="{FF2B5EF4-FFF2-40B4-BE49-F238E27FC236}">
-                <a16:creationId xmlns:a16="http://schemas.microsoft.com/office/drawing/2014/main" id="{BF59ABCF-20B2-4581-B9FC-0DDB28C568E3}"/>
+                <a16:creationId xmlns:a16="http://schemas.microsoft.com/office/drawing/2014/main" id="{D98FF3B4-6936-41A2-86B4-162525B291D4}"/>
               </a:ext>
             </a:extLst>
           </p:cNvPr>
@@ -11900,14 +11851,18 @@
           <a:bodyPr/>
           <a:lstStyle/>
           <a:p>
-            <a:endParaRPr lang="en-US"/>
+            <a:r>
+              <a:rPr lang="en-US"/>
+              <a:t>https://github.com/dvdmrk/DockerPresentation/tree/main/Scripts#file-structure</a:t>
+            </a:r>
+            <a:endParaRPr lang="en-US" dirty="0"/>
           </a:p>
         </p:txBody>
       </p:sp>
     </p:spTree>
     <p:extLst>
       <p:ext uri="{BB962C8B-B14F-4D97-AF65-F5344CB8AC3E}">
-        <p14:creationId xmlns:p14="http://schemas.microsoft.com/office/powerpoint/2010/main" val="1803571929"/>
+        <p14:creationId xmlns:p14="http://schemas.microsoft.com/office/powerpoint/2010/main" val="4235451571"/>
       </p:ext>
     </p:extLst>
   </p:cSld>
@@ -11939,7 +11894,7 @@
           <p:cNvPr id="2" name="Title 1">
             <a:extLst>
               <a:ext uri="{FF2B5EF4-FFF2-40B4-BE49-F238E27FC236}">
-                <a16:creationId xmlns:a16="http://schemas.microsoft.com/office/drawing/2014/main" id="{D36B3062-60B2-456A-8980-59BC1E7849F4}"/>
+                <a16:creationId xmlns:a16="http://schemas.microsoft.com/office/drawing/2014/main" id="{58D25F23-C1E4-40B6-B86F-A11B46A73757}"/>
               </a:ext>
             </a:extLst>
           </p:cNvPr>
@@ -11957,7 +11912,7 @@
           <a:p>
             <a:r>
               <a:rPr lang="en-US" dirty="0"/>
-              <a:t>Tools</a:t>
+              <a:t>Demo</a:t>
             </a:r>
           </a:p>
         </p:txBody>
@@ -11967,7 +11922,7 @@
           <p:cNvPr id="3" name="Content Placeholder 2">
             <a:extLst>
               <a:ext uri="{FF2B5EF4-FFF2-40B4-BE49-F238E27FC236}">
-                <a16:creationId xmlns:a16="http://schemas.microsoft.com/office/drawing/2014/main" id="{4F19CE7C-CA31-4479-86D9-AE30ABB11AC2}"/>
+                <a16:creationId xmlns:a16="http://schemas.microsoft.com/office/drawing/2014/main" id="{E690E601-2332-4929-8EA4-2716E4E021A6}"/>
               </a:ext>
             </a:extLst>
           </p:cNvPr>
@@ -11983,14 +11938,14 @@
           <a:bodyPr/>
           <a:lstStyle/>
           <a:p>
-            <a:endParaRPr lang="en-US"/>
+            <a:endParaRPr lang="en-US" dirty="0"/>
           </a:p>
         </p:txBody>
       </p:sp>
     </p:spTree>
     <p:extLst>
       <p:ext uri="{BB962C8B-B14F-4D97-AF65-F5344CB8AC3E}">
-        <p14:creationId xmlns:p14="http://schemas.microsoft.com/office/powerpoint/2010/main" val="476875038"/>
+        <p14:creationId xmlns:p14="http://schemas.microsoft.com/office/powerpoint/2010/main" val="1728309309"/>
       </p:ext>
     </p:extLst>
   </p:cSld>

</xml_diff>

<commit_message>
finished slides and demo
</commit_message>
<xml_diff>
--- a/Slides/DockerPresentation.pptx
+++ b/Slides/DockerPresentation.pptx
@@ -5,7 +5,7 @@
     <p:sldMasterId id="2147483648" r:id="rId1"/>
   </p:sldMasterIdLst>
   <p:notesMasterIdLst>
-    <p:notesMasterId r:id="rId38"/>
+    <p:notesMasterId r:id="rId37"/>
   </p:notesMasterIdLst>
   <p:sldIdLst>
     <p:sldId id="311" r:id="rId2"/>
@@ -36,14 +36,13 @@
     <p:sldId id="293" r:id="rId27"/>
     <p:sldId id="303" r:id="rId28"/>
     <p:sldId id="295" r:id="rId29"/>
-    <p:sldId id="264" r:id="rId30"/>
-    <p:sldId id="308" r:id="rId31"/>
-    <p:sldId id="291" r:id="rId32"/>
-    <p:sldId id="304" r:id="rId33"/>
-    <p:sldId id="305" r:id="rId34"/>
-    <p:sldId id="306" r:id="rId35"/>
-    <p:sldId id="277" r:id="rId36"/>
-    <p:sldId id="309" r:id="rId37"/>
+    <p:sldId id="308" r:id="rId30"/>
+    <p:sldId id="291" r:id="rId31"/>
+    <p:sldId id="304" r:id="rId32"/>
+    <p:sldId id="305" r:id="rId33"/>
+    <p:sldId id="306" r:id="rId34"/>
+    <p:sldId id="277" r:id="rId35"/>
+    <p:sldId id="309" r:id="rId36"/>
   </p:sldIdLst>
   <p:sldSz cx="12192000" cy="6858000"/>
   <p:notesSz cx="6858000" cy="9144000"/>
@@ -8486,7 +8485,7 @@
           <a:p>
             <a:fld id="{8C60E988-0E53-4576-9AF6-061A69C37B54}" type="datetimeFigureOut">
               <a:rPr lang="en-US" smtClean="0"/>
-              <a:t>8/25/2021</a:t>
+              <a:t>8/26/2021</a:t>
             </a:fld>
             <a:endParaRPr lang="en-US"/>
           </a:p>
@@ -9449,19 +9448,15 @@
           <a:p>
             <a:r>
               <a:rPr lang="en-US" dirty="0"/>
-              <a:t>Build an image</a:t>
+              <a:t>From the </a:t>
             </a:r>
-          </a:p>
-          <a:p>
+            <a:r>
+              <a:rPr lang="en-US" dirty="0" err="1"/>
+              <a:t>DockerRockstar</a:t>
+            </a:r>
             <a:r>
               <a:rPr lang="en-US" dirty="0"/>
-              <a:t>Push an image</a:t>
-            </a:r>
-          </a:p>
-          <a:p>
-            <a:r>
-              <a:rPr lang="en-US" dirty="0"/>
-              <a:t>Run/ Stop/ Start a container</a:t>
+              <a:t> directory</a:t>
             </a:r>
           </a:p>
         </p:txBody>
@@ -9483,7 +9478,7 @@
           <a:p>
             <a:fld id="{F30FD791-8B42-4D59-9CF0-F06A56745129}" type="slidenum">
               <a:rPr lang="en-US" smtClean="0"/>
-              <a:t>29</a:t>
+              <a:t>16</a:t>
             </a:fld>
             <a:endParaRPr lang="en-US"/>
           </a:p>
@@ -9492,7 +9487,7 @@
     </p:spTree>
     <p:extLst>
       <p:ext uri="{BB962C8B-B14F-4D97-AF65-F5344CB8AC3E}">
-        <p14:creationId xmlns:p14="http://schemas.microsoft.com/office/powerpoint/2010/main" val="3184617659"/>
+        <p14:creationId xmlns:p14="http://schemas.microsoft.com/office/powerpoint/2010/main" val="1333238611"/>
       </p:ext>
     </p:extLst>
   </p:cSld>
@@ -9582,7 +9577,7 @@
           <a:p>
             <a:fld id="{F30FD791-8B42-4D59-9CF0-F06A56745129}" type="slidenum">
               <a:rPr lang="en-US" smtClean="0"/>
-              <a:t>36</a:t>
+              <a:t>35</a:t>
             </a:fld>
             <a:endParaRPr lang="en-US"/>
           </a:p>
@@ -9748,7 +9743,7 @@
           <a:p>
             <a:fld id="{8E15E524-1FF9-4C95-8955-8BC6196503F9}" type="datetimeFigureOut">
               <a:rPr lang="en-US" smtClean="0"/>
-              <a:t>8/25/2021</a:t>
+              <a:t>8/26/2021</a:t>
             </a:fld>
             <a:endParaRPr lang="en-US"/>
           </a:p>
@@ -9946,7 +9941,7 @@
           <a:p>
             <a:fld id="{8E15E524-1FF9-4C95-8955-8BC6196503F9}" type="datetimeFigureOut">
               <a:rPr lang="en-US" smtClean="0"/>
-              <a:t>8/25/2021</a:t>
+              <a:t>8/26/2021</a:t>
             </a:fld>
             <a:endParaRPr lang="en-US"/>
           </a:p>
@@ -10154,7 +10149,7 @@
           <a:p>
             <a:fld id="{8E15E524-1FF9-4C95-8955-8BC6196503F9}" type="datetimeFigureOut">
               <a:rPr lang="en-US" smtClean="0"/>
-              <a:t>8/25/2021</a:t>
+              <a:t>8/26/2021</a:t>
             </a:fld>
             <a:endParaRPr lang="en-US"/>
           </a:p>
@@ -10352,7 +10347,7 @@
           <a:p>
             <a:fld id="{8E15E524-1FF9-4C95-8955-8BC6196503F9}" type="datetimeFigureOut">
               <a:rPr lang="en-US" smtClean="0"/>
-              <a:t>8/25/2021</a:t>
+              <a:t>8/26/2021</a:t>
             </a:fld>
             <a:endParaRPr lang="en-US"/>
           </a:p>
@@ -10627,7 +10622,7 @@
           <a:p>
             <a:fld id="{8E15E524-1FF9-4C95-8955-8BC6196503F9}" type="datetimeFigureOut">
               <a:rPr lang="en-US" smtClean="0"/>
-              <a:t>8/25/2021</a:t>
+              <a:t>8/26/2021</a:t>
             </a:fld>
             <a:endParaRPr lang="en-US"/>
           </a:p>
@@ -10892,7 +10887,7 @@
           <a:p>
             <a:fld id="{8E15E524-1FF9-4C95-8955-8BC6196503F9}" type="datetimeFigureOut">
               <a:rPr lang="en-US" smtClean="0"/>
-              <a:t>8/25/2021</a:t>
+              <a:t>8/26/2021</a:t>
             </a:fld>
             <a:endParaRPr lang="en-US"/>
           </a:p>
@@ -11304,7 +11299,7 @@
           <a:p>
             <a:fld id="{8E15E524-1FF9-4C95-8955-8BC6196503F9}" type="datetimeFigureOut">
               <a:rPr lang="en-US" smtClean="0"/>
-              <a:t>8/25/2021</a:t>
+              <a:t>8/26/2021</a:t>
             </a:fld>
             <a:endParaRPr lang="en-US"/>
           </a:p>
@@ -11445,7 +11440,7 @@
           <a:p>
             <a:fld id="{8E15E524-1FF9-4C95-8955-8BC6196503F9}" type="datetimeFigureOut">
               <a:rPr lang="en-US" smtClean="0"/>
-              <a:t>8/25/2021</a:t>
+              <a:t>8/26/2021</a:t>
             </a:fld>
             <a:endParaRPr lang="en-US"/>
           </a:p>
@@ -11558,7 +11553,7 @@
           <a:p>
             <a:fld id="{8E15E524-1FF9-4C95-8955-8BC6196503F9}" type="datetimeFigureOut">
               <a:rPr lang="en-US" smtClean="0"/>
-              <a:t>8/25/2021</a:t>
+              <a:t>8/26/2021</a:t>
             </a:fld>
             <a:endParaRPr lang="en-US"/>
           </a:p>
@@ -11869,7 +11864,7 @@
           <a:p>
             <a:fld id="{8E15E524-1FF9-4C95-8955-8BC6196503F9}" type="datetimeFigureOut">
               <a:rPr lang="en-US" smtClean="0"/>
-              <a:t>8/25/2021</a:t>
+              <a:t>8/26/2021</a:t>
             </a:fld>
             <a:endParaRPr lang="en-US"/>
           </a:p>
@@ -12157,7 +12152,7 @@
           <a:p>
             <a:fld id="{8E15E524-1FF9-4C95-8955-8BC6196503F9}" type="datetimeFigureOut">
               <a:rPr lang="en-US" smtClean="0"/>
-              <a:t>8/25/2021</a:t>
+              <a:t>8/26/2021</a:t>
             </a:fld>
             <a:endParaRPr lang="en-US"/>
           </a:p>
@@ -12398,7 +12393,7 @@
           <a:p>
             <a:fld id="{8E15E524-1FF9-4C95-8955-8BC6196503F9}" type="datetimeFigureOut">
               <a:rPr lang="en-US" smtClean="0"/>
-              <a:t>8/25/2021</a:t>
+              <a:t>8/26/2021</a:t>
             </a:fld>
             <a:endParaRPr lang="en-US"/>
           </a:p>
@@ -14381,7 +14376,7 @@
                   </a:extLst>
                 </a:hlinkClick>
               </a:rPr>
-              <a:t>https://bit.ly/2Y1FUx6</a:t>
+              <a:t>https://bit.ly/3kvqXL8</a:t>
             </a:r>
             <a:endParaRPr lang="en-US" sz="10000" b="1" spc="-300" dirty="0">
               <a:solidFill>
@@ -15187,7 +15182,7 @@
             <a:pPr lvl="1"/>
             <a:r>
               <a:rPr lang="en-US" dirty="0"/>
-              <a:t>docker image build –t </a:t>
+              <a:t>docker image build -t </a:t>
             </a:r>
             <a:r>
               <a:rPr lang="en-US" dirty="0" err="1"/>
@@ -15195,16 +15190,21 @@
             </a:r>
             <a:r>
               <a:rPr lang="en-US" dirty="0"/>
-              <a:t>/d4dd-web:latest -f </a:t>
+              <a:t>/</a:t>
             </a:r>
             <a:r>
               <a:rPr lang="en-US" dirty="0" err="1"/>
-              <a:t>JumpStartSpa</a:t>
+              <a:t>dockerrockstar-web:latest</a:t>
             </a:r>
             <a:r>
               <a:rPr lang="en-US" dirty="0"/>
-              <a:t> .</a:t>
+              <a:t> </a:t>
             </a:r>
+            <a:r>
+              <a:rPr lang="en-US" dirty="0" err="1"/>
+              <a:t>DockerRockstarSpa</a:t>
+            </a:r>
+            <a:endParaRPr lang="en-US" dirty="0"/>
           </a:p>
           <a:p>
             <a:pPr lvl="1"/>
@@ -15225,11 +15225,19 @@
             </a:r>
             <a:r>
               <a:rPr lang="en-US" dirty="0"/>
-              <a:t>/d4dd-api:latest -f </a:t>
+              <a:t>/</a:t>
             </a:r>
             <a:r>
               <a:rPr lang="en-US" dirty="0" err="1"/>
-              <a:t>JumpStart.Api</a:t>
+              <a:t>dockerrockstar-api:latest</a:t>
+            </a:r>
+            <a:r>
+              <a:rPr lang="en-US" dirty="0"/>
+              <a:t> -f </a:t>
+            </a:r>
+            <a:r>
+              <a:rPr lang="en-US" dirty="0" err="1"/>
+              <a:t>DockerRockstar.Api</a:t>
             </a:r>
             <a:r>
               <a:rPr lang="en-US" dirty="0"/>
@@ -15241,7 +15249,7 @@
             </a:r>
             <a:r>
               <a:rPr lang="en-US" dirty="0"/>
-              <a:t> . </a:t>
+              <a:t> .</a:t>
             </a:r>
           </a:p>
         </p:txBody>
@@ -15532,15 +15540,7 @@
           <a:p>
             <a:r>
               <a:rPr lang="en-US" dirty="0"/>
-              <a:t>docker container run –d --name </a:t>
-            </a:r>
-            <a:r>
-              <a:rPr lang="en-US" dirty="0" err="1"/>
-              <a:t>api</a:t>
-            </a:r>
-            <a:r>
-              <a:rPr lang="en-US" dirty="0"/>
-              <a:t> -p 8081:80 </a:t>
+              <a:t>docker container run -d --name web -p 8082:80 </a:t>
             </a:r>
             <a:r>
               <a:rPr lang="en-US" dirty="0" err="1"/>
@@ -15548,29 +15548,20 @@
             </a:r>
             <a:r>
               <a:rPr lang="en-US" dirty="0"/>
-              <a:t>/d4dd-api:latest</a:t>
-            </a:r>
-          </a:p>
-          <a:p>
-            <a:r>
-              <a:rPr lang="en-US" dirty="0"/>
-              <a:t>docker container run –d --name web -p 8081:80 </a:t>
+              <a:t>/</a:t>
             </a:r>
             <a:r>
               <a:rPr lang="en-US" dirty="0" err="1"/>
-              <a:t>dvdmrk</a:t>
+              <a:t>dockerrockstar-web:latest</a:t>
             </a:r>
-            <a:r>
-              <a:rPr lang="en-US" dirty="0"/>
-              <a:t>/d4dd-web:latest</a:t>
-            </a:r>
+            <a:endParaRPr lang="en-US" dirty="0"/>
           </a:p>
           <a:p>
             <a:r>
               <a:rPr lang="en-US" dirty="0">
                 <a:hlinkClick r:id="rId2"/>
               </a:rPr>
-              <a:t>http://localhost:8081</a:t>
+              <a:t>http://localhost:8082/</a:t>
             </a:r>
             <a:endParaRPr lang="en-US" dirty="0"/>
           </a:p>
@@ -16048,7 +16039,7 @@
               <a:rPr lang="en-US" dirty="0">
                 <a:hlinkClick r:id="rId2"/>
               </a:rPr>
-              <a:t>http://localhost:8081</a:t>
+              <a:t>http://localhost:8082/</a:t>
             </a:r>
             <a:endParaRPr lang="en-US" dirty="0"/>
           </a:p>
@@ -16146,7 +16137,7 @@
               <a:rPr lang="en-US" dirty="0">
                 <a:hlinkClick r:id="rId2"/>
               </a:rPr>
-              <a:t>http://localhost:8081</a:t>
+              <a:t>http://localhost:8082/</a:t>
             </a:r>
             <a:endParaRPr lang="en-US" dirty="0"/>
           </a:p>
@@ -19549,8 +19540,13 @@
             </a:r>
             <a:r>
               <a:rPr lang="en-US" dirty="0"/>
-              <a:t>/d4dd-api:latest</a:t>
+              <a:t>/</a:t>
             </a:r>
+            <a:r>
+              <a:rPr lang="en-US" dirty="0" err="1"/>
+              <a:t>dockerrockstar-api:latest</a:t>
+            </a:r>
+            <a:endParaRPr lang="en-US" dirty="0"/>
           </a:p>
           <a:p>
             <a:r>
@@ -19563,8 +19559,13 @@
             </a:r>
             <a:r>
               <a:rPr lang="en-US" dirty="0"/>
-              <a:t>/d4dd-web:latest</a:t>
+              <a:t>/</a:t>
             </a:r>
+            <a:r>
+              <a:rPr lang="en-US" dirty="0" err="1"/>
+              <a:t>dockerrockstar-web:latest</a:t>
+            </a:r>
+            <a:endParaRPr lang="en-US" dirty="0"/>
           </a:p>
           <a:p>
             <a:pPr marL="0" indent="0">
@@ -20630,7 +20631,7 @@
                 <a:ea typeface="+mj-ea"/>
                 <a:cs typeface="+mj-cs"/>
               </a:rPr>
-              <a:t>Recap</a:t>
+              <a:t>Deploy/ Scale</a:t>
             </a:r>
           </a:p>
         </p:txBody>
@@ -20744,10 +20745,48 @@
           </a:fontRef>
         </p:style>
       </p:cxnSp>
+      <p:pic>
+        <p:nvPicPr>
+          <p:cNvPr id="13" name="Content Placeholder 19" descr="Diagram&#10;&#10;Description automatically generated">
+            <a:extLst>
+              <a:ext uri="{FF2B5EF4-FFF2-40B4-BE49-F238E27FC236}">
+                <a16:creationId xmlns:a16="http://schemas.microsoft.com/office/drawing/2014/main" id="{C1159D2B-F171-459F-9CDB-BF03410234B8}"/>
+              </a:ext>
+            </a:extLst>
+          </p:cNvPr>
+          <p:cNvPicPr>
+            <a:picLocks noGrp="1" noChangeAspect="1"/>
+          </p:cNvPicPr>
+          <p:nvPr>
+            <p:ph idx="1"/>
+          </p:nvPr>
+        </p:nvPicPr>
+        <p:blipFill>
+          <a:blip r:embed="rId2">
+            <a:extLst>
+              <a:ext uri="{28A0092B-C50C-407E-A947-70E740481C1C}">
+                <a14:useLocalDpi xmlns:a14="http://schemas.microsoft.com/office/drawing/2010/main" val="0"/>
+              </a:ext>
+            </a:extLst>
+          </a:blip>
+          <a:stretch>
+            <a:fillRect/>
+          </a:stretch>
+        </p:blipFill>
+        <p:spPr>
+          <a:xfrm>
+            <a:off x="1838146" y="2427541"/>
+            <a:ext cx="8460609" cy="3997637"/>
+          </a:xfrm>
+          <a:prstGeom prst="rect">
+            <a:avLst/>
+          </a:prstGeom>
+        </p:spPr>
+      </p:pic>
     </p:spTree>
     <p:extLst>
       <p:ext uri="{BB962C8B-B14F-4D97-AF65-F5344CB8AC3E}">
-        <p14:creationId xmlns:p14="http://schemas.microsoft.com/office/powerpoint/2010/main" val="1728309309"/>
+        <p14:creationId xmlns:p14="http://schemas.microsoft.com/office/powerpoint/2010/main" val="1285539963"/>
       </p:ext>
     </p:extLst>
   </p:cSld>
@@ -27004,355 +27043,6 @@
 <file path=ppt/slides/slide30.xml><?xml version="1.0" encoding="utf-8"?>
 <p:sld xmlns:a="http://schemas.openxmlformats.org/drawingml/2006/main" xmlns:r="http://schemas.openxmlformats.org/officeDocument/2006/relationships" xmlns:p="http://schemas.openxmlformats.org/presentationml/2006/main">
   <p:cSld>
-    <p:bg>
-      <p:bgPr>
-        <a:solidFill>
-          <a:schemeClr val="bg1"/>
-        </a:solidFill>
-        <a:effectLst/>
-      </p:bgPr>
-    </p:bg>
-    <p:spTree>
-      <p:nvGrpSpPr>
-        <p:cNvPr id="1" name=""/>
-        <p:cNvGrpSpPr/>
-        <p:nvPr/>
-      </p:nvGrpSpPr>
-      <p:grpSpPr>
-        <a:xfrm>
-          <a:off x="0" y="0"/>
-          <a:ext cx="0" cy="0"/>
-          <a:chOff x="0" y="0"/>
-          <a:chExt cx="0" cy="0"/>
-        </a:xfrm>
-      </p:grpSpPr>
-      <p:cxnSp>
-        <p:nvCxnSpPr>
-          <p:cNvPr id="21" name="Straight Connector 20">
-            <a:extLst>
-              <a:ext uri="{FF2B5EF4-FFF2-40B4-BE49-F238E27FC236}">
-                <a16:creationId xmlns:a16="http://schemas.microsoft.com/office/drawing/2014/main" id="{D2E961F1-4A28-4A5F-BBD4-6E400E5E6C75}"/>
-              </a:ext>
-              <a:ext uri="{C183D7F6-B498-43B3-948B-1728B52AA6E4}">
-                <adec:decorative xmlns:adec="http://schemas.microsoft.com/office/drawing/2017/decorative" val="1"/>
-              </a:ext>
-            </a:extLst>
-          </p:cNvPr>
-          <p:cNvCxnSpPr>
-            <a:cxnSpLocks noGrp="1" noRot="1" noChangeAspect="1" noMove="1" noResize="1" noEditPoints="1" noAdjustHandles="1" noChangeArrowheads="1" noChangeShapeType="1"/>
-          </p:cNvCxnSpPr>
-          <p:nvPr>
-            <p:extLst>
-              <p:ext uri="{386F3935-93C4-4BCD-93E2-E3B085C9AB24}">
-                <p16:designElem xmlns:p16="http://schemas.microsoft.com/office/powerpoint/2015/main" val="1"/>
-              </p:ext>
-            </p:extLst>
-          </p:nvPr>
-        </p:nvCxnSpPr>
-        <p:spPr bwMode="white">
-          <a:xfrm>
-            <a:off x="0" y="272357"/>
-            <a:ext cx="12188824" cy="0"/>
-          </a:xfrm>
-          <a:prstGeom prst="line">
-            <a:avLst/>
-          </a:prstGeom>
-          <a:ln w="50800">
-            <a:solidFill>
-              <a:schemeClr val="tx1">
-                <a:lumMod val="75000"/>
-                <a:lumOff val="25000"/>
-              </a:schemeClr>
-            </a:solidFill>
-          </a:ln>
-        </p:spPr>
-        <p:style>
-          <a:lnRef idx="1">
-            <a:schemeClr val="accent1"/>
-          </a:lnRef>
-          <a:fillRef idx="0">
-            <a:schemeClr val="accent1"/>
-          </a:fillRef>
-          <a:effectRef idx="0">
-            <a:schemeClr val="accent1"/>
-          </a:effectRef>
-          <a:fontRef idx="minor">
-            <a:schemeClr val="tx1"/>
-          </a:fontRef>
-        </p:style>
-      </p:cxnSp>
-      <p:sp>
-        <p:nvSpPr>
-          <p:cNvPr id="23" name="Rectangle 22">
-            <a:extLst>
-              <a:ext uri="{FF2B5EF4-FFF2-40B4-BE49-F238E27FC236}">
-                <a16:creationId xmlns:a16="http://schemas.microsoft.com/office/drawing/2014/main" id="{7F57BEA8-497D-4AA8-8A18-BDCD696B25FE}"/>
-              </a:ext>
-              <a:ext uri="{C183D7F6-B498-43B3-948B-1728B52AA6E4}">
-                <adec:decorative xmlns:adec="http://schemas.microsoft.com/office/drawing/2017/decorative" val="1"/>
-              </a:ext>
-            </a:extLst>
-          </p:cNvPr>
-          <p:cNvSpPr>
-            <a:spLocks noGrp="1" noRot="1" noChangeAspect="1" noMove="1" noResize="1" noEditPoints="1" noAdjustHandles="1" noChangeArrowheads="1" noChangeShapeType="1" noTextEdit="1"/>
-          </p:cNvSpPr>
-          <p:nvPr>
-            <p:extLst>
-              <p:ext uri="{386F3935-93C4-4BCD-93E2-E3B085C9AB24}">
-                <p16:designElem xmlns:p16="http://schemas.microsoft.com/office/powerpoint/2015/main" val="1"/>
-              </p:ext>
-            </p:extLst>
-          </p:nvPr>
-        </p:nvSpPr>
-        <p:spPr>
-          <a:xfrm>
-            <a:off x="0" y="368596"/>
-            <a:ext cx="12192000" cy="1735555"/>
-          </a:xfrm>
-          <a:prstGeom prst="rect">
-            <a:avLst/>
-          </a:prstGeom>
-          <a:solidFill>
-            <a:schemeClr val="tx1">
-              <a:lumMod val="75000"/>
-              <a:lumOff val="25000"/>
-            </a:schemeClr>
-          </a:solidFill>
-          <a:ln>
-            <a:noFill/>
-          </a:ln>
-        </p:spPr>
-        <p:style>
-          <a:lnRef idx="2">
-            <a:schemeClr val="accent1">
-              <a:shade val="50000"/>
-            </a:schemeClr>
-          </a:lnRef>
-          <a:fillRef idx="1">
-            <a:schemeClr val="accent1"/>
-          </a:fillRef>
-          <a:effectRef idx="0">
-            <a:schemeClr val="accent1"/>
-          </a:effectRef>
-          <a:fontRef idx="minor">
-            <a:schemeClr val="lt1"/>
-          </a:fontRef>
-        </p:style>
-        <p:txBody>
-          <a:bodyPr rtlCol="0" anchor="ctr"/>
-          <a:lstStyle/>
-          <a:p>
-            <a:pPr algn="ctr"/>
-            <a:endParaRPr lang="en-US"/>
-          </a:p>
-        </p:txBody>
-      </p:sp>
-      <p:sp>
-        <p:nvSpPr>
-          <p:cNvPr id="2" name="Title 1">
-            <a:extLst>
-              <a:ext uri="{FF2B5EF4-FFF2-40B4-BE49-F238E27FC236}">
-                <a16:creationId xmlns:a16="http://schemas.microsoft.com/office/drawing/2014/main" id="{58D25F23-C1E4-40B6-B86F-A11B46A73757}"/>
-              </a:ext>
-            </a:extLst>
-          </p:cNvPr>
-          <p:cNvSpPr>
-            <a:spLocks noGrp="1"/>
-          </p:cNvSpPr>
-          <p:nvPr>
-            <p:ph type="title"/>
-          </p:nvPr>
-        </p:nvSpPr>
-        <p:spPr>
-          <a:xfrm>
-            <a:off x="526073" y="489439"/>
-            <a:ext cx="11139854" cy="930447"/>
-          </a:xfrm>
-        </p:spPr>
-        <p:txBody>
-          <a:bodyPr vert="horz" lIns="91440" tIns="45720" rIns="91440" bIns="45720" rtlCol="0" anchor="b">
-            <a:normAutofit/>
-          </a:bodyPr>
-          <a:lstStyle/>
-          <a:p>
-            <a:pPr algn="ctr"/>
-            <a:r>
-              <a:rPr lang="en-US" sz="5400" kern="1200" dirty="0">
-                <a:solidFill>
-                  <a:schemeClr val="bg1"/>
-                </a:solidFill>
-                <a:latin typeface="+mj-lt"/>
-                <a:ea typeface="+mj-ea"/>
-                <a:cs typeface="+mj-cs"/>
-              </a:rPr>
-              <a:t>Deploy/ Scale</a:t>
-            </a:r>
-          </a:p>
-        </p:txBody>
-      </p:sp>
-      <p:cxnSp>
-        <p:nvCxnSpPr>
-          <p:cNvPr id="25" name="Straight Connector 24">
-            <a:extLst>
-              <a:ext uri="{FF2B5EF4-FFF2-40B4-BE49-F238E27FC236}">
-                <a16:creationId xmlns:a16="http://schemas.microsoft.com/office/drawing/2014/main" id="{A82415D3-DDE5-4D63-8CB3-23A5EC581B27}"/>
-              </a:ext>
-              <a:ext uri="{C183D7F6-B498-43B3-948B-1728B52AA6E4}">
-                <adec:decorative xmlns:adec="http://schemas.microsoft.com/office/drawing/2017/decorative" val="1"/>
-              </a:ext>
-            </a:extLst>
-          </p:cNvPr>
-          <p:cNvCxnSpPr>
-            <a:cxnSpLocks noGrp="1" noRot="1" noChangeAspect="1" noMove="1" noResize="1" noEditPoints="1" noAdjustHandles="1" noChangeArrowheads="1" noChangeShapeType="1"/>
-          </p:cNvCxnSpPr>
-          <p:nvPr>
-            <p:extLst>
-              <p:ext uri="{386F3935-93C4-4BCD-93E2-E3B085C9AB24}">
-                <p16:designElem xmlns:p16="http://schemas.microsoft.com/office/powerpoint/2015/main" val="1"/>
-              </p:ext>
-            </p:extLst>
-          </p:nvPr>
-        </p:nvCxnSpPr>
-        <p:spPr>
-          <a:xfrm>
-            <a:off x="4724400" y="1479733"/>
-            <a:ext cx="2743200" cy="0"/>
-          </a:xfrm>
-          <a:prstGeom prst="line">
-            <a:avLst/>
-          </a:prstGeom>
-          <a:ln w="19050">
-            <a:solidFill>
-              <a:schemeClr val="bg1">
-                <a:alpha val="75000"/>
-              </a:schemeClr>
-            </a:solidFill>
-          </a:ln>
-        </p:spPr>
-        <p:style>
-          <a:lnRef idx="1">
-            <a:schemeClr val="accent1"/>
-          </a:lnRef>
-          <a:fillRef idx="0">
-            <a:schemeClr val="accent1"/>
-          </a:fillRef>
-          <a:effectRef idx="0">
-            <a:schemeClr val="accent1"/>
-          </a:effectRef>
-          <a:fontRef idx="minor">
-            <a:schemeClr val="tx1"/>
-          </a:fontRef>
-        </p:style>
-      </p:cxnSp>
-      <p:cxnSp>
-        <p:nvCxnSpPr>
-          <p:cNvPr id="27" name="Straight Connector 26">
-            <a:extLst>
-              <a:ext uri="{FF2B5EF4-FFF2-40B4-BE49-F238E27FC236}">
-                <a16:creationId xmlns:a16="http://schemas.microsoft.com/office/drawing/2014/main" id="{AD7193FB-6AE6-4B3B-8F89-56B55DD63B4D}"/>
-              </a:ext>
-              <a:ext uri="{C183D7F6-B498-43B3-948B-1728B52AA6E4}">
-                <adec:decorative xmlns:adec="http://schemas.microsoft.com/office/drawing/2017/decorative" val="1"/>
-              </a:ext>
-            </a:extLst>
-          </p:cNvPr>
-          <p:cNvCxnSpPr>
-            <a:cxnSpLocks noGrp="1" noRot="1" noChangeAspect="1" noMove="1" noResize="1" noEditPoints="1" noAdjustHandles="1" noChangeArrowheads="1" noChangeShapeType="1"/>
-          </p:cNvCxnSpPr>
-          <p:nvPr>
-            <p:extLst>
-              <p:ext uri="{386F3935-93C4-4BCD-93E2-E3B085C9AB24}">
-                <p16:designElem xmlns:p16="http://schemas.microsoft.com/office/powerpoint/2015/main" val="1"/>
-              </p:ext>
-            </p:extLst>
-          </p:nvPr>
-        </p:nvCxnSpPr>
-        <p:spPr bwMode="white">
-          <a:xfrm>
-            <a:off x="0" y="2201402"/>
-            <a:ext cx="12188824" cy="0"/>
-          </a:xfrm>
-          <a:prstGeom prst="line">
-            <a:avLst/>
-          </a:prstGeom>
-          <a:ln w="50800">
-            <a:solidFill>
-              <a:schemeClr val="tx1">
-                <a:lumMod val="75000"/>
-                <a:lumOff val="25000"/>
-              </a:schemeClr>
-            </a:solidFill>
-          </a:ln>
-        </p:spPr>
-        <p:style>
-          <a:lnRef idx="1">
-            <a:schemeClr val="accent1"/>
-          </a:lnRef>
-          <a:fillRef idx="0">
-            <a:schemeClr val="accent1"/>
-          </a:fillRef>
-          <a:effectRef idx="0">
-            <a:schemeClr val="accent1"/>
-          </a:effectRef>
-          <a:fontRef idx="minor">
-            <a:schemeClr val="tx1"/>
-          </a:fontRef>
-        </p:style>
-      </p:cxnSp>
-      <p:pic>
-        <p:nvPicPr>
-          <p:cNvPr id="13" name="Content Placeholder 19" descr="Diagram&#10;&#10;Description automatically generated">
-            <a:extLst>
-              <a:ext uri="{FF2B5EF4-FFF2-40B4-BE49-F238E27FC236}">
-                <a16:creationId xmlns:a16="http://schemas.microsoft.com/office/drawing/2014/main" id="{C1159D2B-F171-459F-9CDB-BF03410234B8}"/>
-              </a:ext>
-            </a:extLst>
-          </p:cNvPr>
-          <p:cNvPicPr>
-            <a:picLocks noGrp="1" noChangeAspect="1"/>
-          </p:cNvPicPr>
-          <p:nvPr>
-            <p:ph idx="1"/>
-          </p:nvPr>
-        </p:nvPicPr>
-        <p:blipFill>
-          <a:blip r:embed="rId2">
-            <a:extLst>
-              <a:ext uri="{28A0092B-C50C-407E-A947-70E740481C1C}">
-                <a14:useLocalDpi xmlns:a14="http://schemas.microsoft.com/office/drawing/2010/main" val="0"/>
-              </a:ext>
-            </a:extLst>
-          </a:blip>
-          <a:stretch>
-            <a:fillRect/>
-          </a:stretch>
-        </p:blipFill>
-        <p:spPr>
-          <a:xfrm>
-            <a:off x="1838146" y="2427541"/>
-            <a:ext cx="8460609" cy="3997637"/>
-          </a:xfrm>
-          <a:prstGeom prst="rect">
-            <a:avLst/>
-          </a:prstGeom>
-        </p:spPr>
-      </p:pic>
-    </p:spTree>
-    <p:extLst>
-      <p:ext uri="{BB962C8B-B14F-4D97-AF65-F5344CB8AC3E}">
-        <p14:creationId xmlns:p14="http://schemas.microsoft.com/office/powerpoint/2010/main" val="1285539963"/>
-      </p:ext>
-    </p:extLst>
-  </p:cSld>
-  <p:clrMapOvr>
-    <a:masterClrMapping/>
-  </p:clrMapOvr>
-</p:sld>
-</file>
-
-<file path=ppt/slides/slide31.xml><?xml version="1.0" encoding="utf-8"?>
-<p:sld xmlns:a="http://schemas.openxmlformats.org/drawingml/2006/main" xmlns:r="http://schemas.openxmlformats.org/officeDocument/2006/relationships" xmlns:p="http://schemas.openxmlformats.org/presentationml/2006/main">
-  <p:cSld>
     <p:spTree>
       <p:nvGrpSpPr>
         <p:cNvPr id="1" name=""/>
@@ -27521,7 +27211,7 @@
 </p:sld>
 </file>
 
-<file path=ppt/slides/slide32.xml><?xml version="1.0" encoding="utf-8"?>
+<file path=ppt/slides/slide31.xml><?xml version="1.0" encoding="utf-8"?>
 <p:sld xmlns:a="http://schemas.openxmlformats.org/drawingml/2006/main" xmlns:r="http://schemas.openxmlformats.org/officeDocument/2006/relationships" xmlns:p="http://schemas.openxmlformats.org/presentationml/2006/main">
   <p:cSld>
     <p:spTree>
@@ -27635,11 +27325,11 @@
             <a:pPr lvl="1"/>
             <a:r>
               <a:rPr lang="en-US" dirty="0"/>
-              <a:t>docker service create --name web -p 8080:80 --replicas 3 </a:t>
+              <a:t>docker service create --name web -p 8082:80 --replicas 3 </a:t>
             </a:r>
             <a:r>
               <a:rPr lang="en-US" dirty="0" err="1"/>
-              <a:t>jumpstartweb</a:t>
+              <a:t>dockerrockstarweb</a:t>
             </a:r>
             <a:endParaRPr lang="en-US" dirty="0"/>
           </a:p>
@@ -27687,7 +27377,7 @@
 </p:sld>
 </file>
 
-<file path=ppt/slides/slide33.xml><?xml version="1.0" encoding="utf-8"?>
+<file path=ppt/slides/slide32.xml><?xml version="1.0" encoding="utf-8"?>
 <p:sld xmlns:a="http://schemas.openxmlformats.org/drawingml/2006/main" xmlns:r="http://schemas.openxmlformats.org/officeDocument/2006/relationships" xmlns:p="http://schemas.openxmlformats.org/presentationml/2006/main">
   <p:cSld>
     <p:spTree>
@@ -28472,7 +28162,7 @@
 </p:sld>
 </file>
 
-<file path=ppt/slides/slide34.xml><?xml version="1.0" encoding="utf-8"?>
+<file path=ppt/slides/slide33.xml><?xml version="1.0" encoding="utf-8"?>
 <p:sld xmlns:a="http://schemas.openxmlformats.org/drawingml/2006/main" xmlns:r="http://schemas.openxmlformats.org/officeDocument/2006/relationships" xmlns:p="http://schemas.openxmlformats.org/presentationml/2006/main">
   <p:cSld>
     <p:spTree>
@@ -28572,8 +28262,13 @@
             </a:r>
             <a:r>
               <a:rPr lang="en-US" dirty="0"/>
-              <a:t> d4dd</a:t>
+              <a:t> </a:t>
             </a:r>
+            <a:r>
+              <a:rPr lang="en-US" dirty="0" err="1"/>
+              <a:t>dockerrockstar</a:t>
+            </a:r>
+            <a:endParaRPr lang="en-US" dirty="0"/>
           </a:p>
           <a:p>
             <a:r>
@@ -28605,8 +28300,13 @@
             <a:pPr lvl="2"/>
             <a:r>
               <a:rPr lang="en-US" dirty="0"/>
-              <a:t>docker stack services d4dd</a:t>
+              <a:t>docker stack services </a:t>
             </a:r>
+            <a:r>
+              <a:rPr lang="en-US" dirty="0" err="1"/>
+              <a:t>dockerrockstar</a:t>
+            </a:r>
+            <a:endParaRPr lang="en-US" dirty="0"/>
           </a:p>
           <a:p>
             <a:r>
@@ -28641,8 +28341,13 @@
             </a:r>
             <a:r>
               <a:rPr lang="en-US" dirty="0"/>
-              <a:t> d4dd</a:t>
+              <a:t> </a:t>
             </a:r>
+            <a:r>
+              <a:rPr lang="en-US" dirty="0" err="1"/>
+              <a:t>dockerrockstar</a:t>
+            </a:r>
+            <a:endParaRPr lang="en-US" dirty="0"/>
           </a:p>
           <a:p>
             <a:r>
@@ -28674,8 +28379,13 @@
             <a:pPr lvl="2"/>
             <a:r>
               <a:rPr lang="en-US" dirty="0"/>
-              <a:t>docker stack rm d4dd</a:t>
+              <a:t>docker stack rm </a:t>
             </a:r>
+            <a:r>
+              <a:rPr lang="en-US" dirty="0" err="1"/>
+              <a:t>dockerrockstar</a:t>
+            </a:r>
+            <a:endParaRPr lang="en-US" dirty="0"/>
           </a:p>
         </p:txBody>
       </p:sp>
@@ -28692,7 +28402,7 @@
 </p:sld>
 </file>
 
-<file path=ppt/slides/slide35.xml><?xml version="1.0" encoding="utf-8"?>
+<file path=ppt/slides/slide34.xml><?xml version="1.0" encoding="utf-8"?>
 <p:sld xmlns:a="http://schemas.openxmlformats.org/drawingml/2006/main" xmlns:r="http://schemas.openxmlformats.org/officeDocument/2006/relationships" xmlns:p="http://schemas.openxmlformats.org/presentationml/2006/main">
   <p:cSld>
     <p:bg>
@@ -28856,7 +28566,7 @@
 </p:sld>
 </file>
 
-<file path=ppt/slides/slide36.xml><?xml version="1.0" encoding="utf-8"?>
+<file path=ppt/slides/slide35.xml><?xml version="1.0" encoding="utf-8"?>
 <p:sld xmlns:a="http://schemas.openxmlformats.org/drawingml/2006/main" xmlns:r="http://schemas.openxmlformats.org/officeDocument/2006/relationships" xmlns:p="http://schemas.openxmlformats.org/presentationml/2006/main">
   <p:cSld>
     <p:bg>

</xml_diff>